<commit_message>
orientacao apresentacao seminario andamento
</commit_message>
<xml_diff>
--- a/SeminarioAndamento.pptx
+++ b/SeminarioAndamento.pptx
@@ -409,6 +409,11 @@
         </p:txBody>
       </p:sp>
     </p:spTree>
+    <p:extLst>
+      <p:ext uri="{BB962C8B-B14F-4D97-AF65-F5344CB8AC3E}">
+        <p14:creationId xmlns:p14="http://schemas.microsoft.com/office/powerpoint/2010/main" val="819374932"/>
+      </p:ext>
+    </p:extLst>
   </p:cSld>
   <p:clrMap bg1="lt1" tx1="dk1" bg2="dk2" tx2="lt2" accent1="accent1" accent2="accent2" accent3="accent3" accent4="accent4" accent5="accent5" accent6="accent6" hlink="hlink" folHlink="folHlink"/>
   <p:notesStyle>
@@ -600,6 +605,11 @@
         </p:txBody>
       </p:sp>
     </p:spTree>
+    <p:extLst>
+      <p:ext uri="{BB962C8B-B14F-4D97-AF65-F5344CB8AC3E}">
+        <p14:creationId xmlns:p14="http://schemas.microsoft.com/office/powerpoint/2010/main" val="2734995289"/>
+      </p:ext>
+    </p:extLst>
   </p:cSld>
   <p:clrMapOvr>
     <a:masterClrMapping/>
@@ -1231,6 +1241,11 @@
         </p:txBody>
       </p:sp>
     </p:spTree>
+    <p:extLst>
+      <p:ext uri="{BB962C8B-B14F-4D97-AF65-F5344CB8AC3E}">
+        <p14:creationId xmlns:p14="http://schemas.microsoft.com/office/powerpoint/2010/main" val="2421907940"/>
+      </p:ext>
+    </p:extLst>
   </p:cSld>
   <p:clrMapOvr>
     <a:masterClrMapping/>
@@ -1332,6 +1347,11 @@
         </p:txBody>
       </p:sp>
     </p:spTree>
+    <p:extLst>
+      <p:ext uri="{BB962C8B-B14F-4D97-AF65-F5344CB8AC3E}">
+        <p14:creationId xmlns:p14="http://schemas.microsoft.com/office/powerpoint/2010/main" val="1485673303"/>
+      </p:ext>
+    </p:extLst>
   </p:cSld>
   <p:clrMapOvr>
     <a:masterClrMapping/>
@@ -3548,17 +3568,25 @@
             <a:br>
               <a:rPr lang="pt-BR" sz="3600" dirty="0"/>
             </a:br>
-            <a:br>
+            <a:r>
               <a:rPr lang="pt-BR" sz="3600" dirty="0"/>
-            </a:br>
+              <a:t/>
+            </a:r>
             <a:br>
               <a:rPr lang="pt-BR" sz="3600" dirty="0"/>
             </a:br>
             <a:r>
               <a:rPr lang="pt-BR" sz="3600" dirty="0"/>
+              <a:t/>
+            </a:r>
+            <a:br>
+              <a:rPr lang="pt-BR" sz="3600" dirty="0"/>
+            </a:br>
+            <a:r>
+              <a:rPr lang="pt-BR" sz="3200" dirty="0"/>
               <a:t>Orientadora: Patricia Nogueira Hubler</a:t>
             </a:r>
-            <a:endParaRPr lang="en" sz="3600" dirty="0"/>
+            <a:endParaRPr lang="en" sz="3200" dirty="0"/>
           </a:p>
         </p:txBody>
       </p:sp>
@@ -3567,6 +3595,13 @@
   <p:clrMapOvr>
     <a:masterClrMapping/>
   </p:clrMapOvr>
+  <p:timing>
+    <p:tnLst>
+      <p:par>
+        <p:cTn id="1" dur="indefinite" restart="never" nodeType="tmRoot"/>
+      </p:par>
+    </p:tnLst>
+  </p:timing>
 </p:sld>
 </file>
 
@@ -3631,7 +3666,7 @@
           <p:cNvPr id="3" name="CaixaDeTexto 2">
             <a:extLst>
               <a:ext uri="{FF2B5EF4-FFF2-40B4-BE49-F238E27FC236}">
-                <a16:creationId xmlns:a16="http://schemas.microsoft.com/office/drawing/2014/main" id="{0C2DEAAA-983E-40A8-ABB7-ACC1A6BA213D}"/>
+                <a16:creationId xmlns:a16="http://schemas.microsoft.com/office/drawing/2014/main" xmlns="" id="{0C2DEAAA-983E-40A8-ABB7-ACC1A6BA213D}"/>
               </a:ext>
             </a:extLst>
           </p:cNvPr>
@@ -3786,7 +3821,7 @@
           <p:cNvPr id="2054" name="Picture 6" descr="Resultado de imagem para Jquery">
             <a:extLst>
               <a:ext uri="{FF2B5EF4-FFF2-40B4-BE49-F238E27FC236}">
-                <a16:creationId xmlns:a16="http://schemas.microsoft.com/office/drawing/2014/main" id="{AB8B9431-A6FA-4393-8637-626272F7E4B4}"/>
+                <a16:creationId xmlns:a16="http://schemas.microsoft.com/office/drawing/2014/main" xmlns="" id="{AB8B9431-A6FA-4393-8637-626272F7E4B4}"/>
               </a:ext>
             </a:extLst>
           </p:cNvPr>
@@ -3833,7 +3868,7 @@
           <p:cNvPr id="2056" name="Picture 8" descr="Resultado de imagem para MySql">
             <a:extLst>
               <a:ext uri="{FF2B5EF4-FFF2-40B4-BE49-F238E27FC236}">
-                <a16:creationId xmlns:a16="http://schemas.microsoft.com/office/drawing/2014/main" id="{6220C71E-ABA5-4428-9749-4F91E4E41AC8}"/>
+                <a16:creationId xmlns:a16="http://schemas.microsoft.com/office/drawing/2014/main" xmlns="" id="{6220C71E-ABA5-4428-9749-4F91E4E41AC8}"/>
               </a:ext>
             </a:extLst>
           </p:cNvPr>
@@ -3880,7 +3915,7 @@
           <p:cNvPr id="2066" name="Picture 18" descr="Resultado de imagem para materialize logo">
             <a:extLst>
               <a:ext uri="{FF2B5EF4-FFF2-40B4-BE49-F238E27FC236}">
-                <a16:creationId xmlns:a16="http://schemas.microsoft.com/office/drawing/2014/main" id="{B6834BF9-8851-4900-BD3B-975A3876A473}"/>
+                <a16:creationId xmlns:a16="http://schemas.microsoft.com/office/drawing/2014/main" xmlns="" id="{B6834BF9-8851-4900-BD3B-975A3876A473}"/>
               </a:ext>
             </a:extLst>
           </p:cNvPr>
@@ -3927,7 +3962,7 @@
           <p:cNvPr id="2070" name="Picture 22" descr="Resultado de imagem para codeigniter logo">
             <a:extLst>
               <a:ext uri="{FF2B5EF4-FFF2-40B4-BE49-F238E27FC236}">
-                <a16:creationId xmlns:a16="http://schemas.microsoft.com/office/drawing/2014/main" id="{DF36EB66-3615-411B-9B5F-3C895FAE31AB}"/>
+                <a16:creationId xmlns:a16="http://schemas.microsoft.com/office/drawing/2014/main" xmlns="" id="{DF36EB66-3615-411B-9B5F-3C895FAE31AB}"/>
               </a:ext>
             </a:extLst>
           </p:cNvPr>
@@ -7098,6 +7133,13 @@
   <p:clrMapOvr>
     <a:masterClrMapping/>
   </p:clrMapOvr>
+  <p:timing>
+    <p:tnLst>
+      <p:par>
+        <p:cTn id="1" dur="indefinite" restart="never" nodeType="tmRoot"/>
+      </p:par>
+    </p:tnLst>
+  </p:timing>
 </p:sld>
 </file>
 
@@ -9975,6 +10017,13 @@
   <p:clrMapOvr>
     <a:masterClrMapping/>
   </p:clrMapOvr>
+  <p:timing>
+    <p:tnLst>
+      <p:par>
+        <p:cTn id="1" dur="indefinite" restart="never" nodeType="tmRoot"/>
+      </p:par>
+    </p:tnLst>
+  </p:timing>
 </p:sld>
 </file>
 
@@ -10039,7 +10088,7 @@
           <p:cNvPr id="3" name="CaixaDeTexto 2">
             <a:extLst>
               <a:ext uri="{FF2B5EF4-FFF2-40B4-BE49-F238E27FC236}">
-                <a16:creationId xmlns:a16="http://schemas.microsoft.com/office/drawing/2014/main" id="{0C2DEAAA-983E-40A8-ABB7-ACC1A6BA213D}"/>
+                <a16:creationId xmlns:a16="http://schemas.microsoft.com/office/drawing/2014/main" xmlns="" id="{0C2DEAAA-983E-40A8-ABB7-ACC1A6BA213D}"/>
               </a:ext>
             </a:extLst>
           </p:cNvPr>
@@ -10088,6 +10137,13 @@
   <p:clrMapOvr>
     <a:masterClrMapping/>
   </p:clrMapOvr>
+  <p:timing>
+    <p:tnLst>
+      <p:par>
+        <p:cTn id="1" dur="indefinite" restart="never" nodeType="tmRoot"/>
+      </p:par>
+    </p:tnLst>
+  </p:timing>
 </p:sld>
 </file>
 
@@ -10146,9 +10202,17 @@
             <a:br>
               <a:rPr lang="pt-BR" sz="3600" dirty="0"/>
             </a:br>
+            <a:r>
+              <a:rPr lang="pt-BR" sz="3600" dirty="0"/>
+              <a:t/>
+            </a:r>
             <a:br>
               <a:rPr lang="pt-BR" sz="3600" dirty="0"/>
             </a:br>
+            <a:r>
+              <a:rPr lang="pt-BR" sz="3600" dirty="0"/>
+              <a:t/>
+            </a:r>
             <a:br>
               <a:rPr lang="pt-BR" sz="3600" dirty="0"/>
             </a:br>
@@ -10170,6 +10234,13 @@
   <p:clrMapOvr>
     <a:masterClrMapping/>
   </p:clrMapOvr>
+  <p:timing>
+    <p:tnLst>
+      <p:par>
+        <p:cTn id="1" dur="indefinite" restart="never" nodeType="tmRoot"/>
+      </p:par>
+    </p:tnLst>
+  </p:timing>
 </p:sld>
 </file>
 
@@ -13042,6 +13113,13 @@
   <p:clrMapOvr>
     <a:masterClrMapping/>
   </p:clrMapOvr>
+  <p:timing>
+    <p:tnLst>
+      <p:par>
+        <p:cTn id="1" dur="indefinite" restart="never" nodeType="tmRoot"/>
+      </p:par>
+    </p:tnLst>
+  </p:timing>
 </p:sld>
 </file>
 
@@ -13106,7 +13184,7 @@
           <p:cNvPr id="3" name="CaixaDeTexto 2">
             <a:extLst>
               <a:ext uri="{FF2B5EF4-FFF2-40B4-BE49-F238E27FC236}">
-                <a16:creationId xmlns:a16="http://schemas.microsoft.com/office/drawing/2014/main" id="{0C2DEAAA-983E-40A8-ABB7-ACC1A6BA213D}"/>
+                <a16:creationId xmlns:a16="http://schemas.microsoft.com/office/drawing/2014/main" xmlns="" id="{0C2DEAAA-983E-40A8-ABB7-ACC1A6BA213D}"/>
               </a:ext>
             </a:extLst>
           </p:cNvPr>
@@ -13134,22 +13212,14 @@
               <a:buChar char="•"/>
             </a:pPr>
             <a:r>
-              <a:rPr lang="pt-BR" sz="2000" dirty="0">
+              <a:rPr lang="pt-BR" sz="2000" dirty="0" smtClean="0">
                 <a:solidFill>
                   <a:schemeClr val="bg1"/>
                 </a:solidFill>
                 <a:latin typeface="Sniglet" panose="020B0604020202020204" charset="0"/>
               </a:rPr>
-              <a:t>Documentação de testes (projetos de pesquisa de robótica)</a:t>
+              <a:t>Acompanhamento dos projetos de pesquisa</a:t>
             </a:r>
-          </a:p>
-          <a:p>
-            <a:endParaRPr lang="pt-BR" sz="2000" dirty="0">
-              <a:solidFill>
-                <a:schemeClr val="bg1"/>
-              </a:solidFill>
-              <a:latin typeface="Sniglet" panose="020B0604020202020204" charset="0"/>
-            </a:endParaRPr>
           </a:p>
           <a:p>
             <a:pPr marL="342900" lvl="8" indent="-342900">
@@ -13157,14 +13227,50 @@
               <a:buChar char="•"/>
             </a:pPr>
             <a:r>
-              <a:rPr lang="pt-BR" sz="2000" dirty="0">
+              <a:rPr lang="pt-BR" sz="2000" dirty="0" smtClean="0">
                 <a:solidFill>
                   <a:schemeClr val="bg1"/>
                 </a:solidFill>
                 <a:latin typeface="Sniglet" panose="020B0604020202020204" charset="0"/>
               </a:rPr>
-              <a:t>Carência de uma plataforma gratuita para planejamento de atividades</a:t>
+              <a:t>Organização da documentação de testes</a:t>
             </a:r>
+          </a:p>
+          <a:p>
+            <a:pPr marL="342900" lvl="8" indent="-342900">
+              <a:buFont typeface="Arial" panose="020B0604020202020204" pitchFamily="34" charset="0"/>
+              <a:buChar char="•"/>
+            </a:pPr>
+            <a:r>
+              <a:rPr lang="pt-BR" sz="2000" dirty="0" smtClean="0">
+                <a:solidFill>
+                  <a:schemeClr val="bg1"/>
+                </a:solidFill>
+                <a:latin typeface="Sniglet" panose="020B0604020202020204" charset="0"/>
+              </a:rPr>
+              <a:t>Definição de atividades a serem desenvolvidas</a:t>
+            </a:r>
+          </a:p>
+          <a:p>
+            <a:pPr marL="342900" lvl="8" indent="-342900">
+              <a:buFont typeface="Arial" panose="020B0604020202020204" pitchFamily="34" charset="0"/>
+              <a:buChar char="•"/>
+            </a:pPr>
+            <a:r>
+              <a:rPr lang="pt-BR" sz="2000" dirty="0" smtClean="0">
+                <a:solidFill>
+                  <a:schemeClr val="bg1"/>
+                </a:solidFill>
+                <a:latin typeface="Sniglet" panose="020B0604020202020204" charset="0"/>
+              </a:rPr>
+              <a:t>Documentação das reuniões dos projetos</a:t>
+            </a:r>
+            <a:endParaRPr lang="pt-BR" sz="2000" dirty="0">
+              <a:solidFill>
+                <a:schemeClr val="bg1"/>
+              </a:solidFill>
+              <a:latin typeface="Sniglet" panose="020B0604020202020204" charset="0"/>
+            </a:endParaRPr>
           </a:p>
         </p:txBody>
       </p:sp>
@@ -13173,6 +13279,13 @@
   <p:clrMapOvr>
     <a:masterClrMapping/>
   </p:clrMapOvr>
+  <p:timing>
+    <p:tnLst>
+      <p:par>
+        <p:cTn id="1" dur="indefinite" restart="never" nodeType="tmRoot"/>
+      </p:par>
+    </p:tnLst>
+  </p:timing>
 </p:sld>
 </file>
 
@@ -13237,7 +13350,7 @@
           <p:cNvPr id="3" name="CaixaDeTexto 2">
             <a:extLst>
               <a:ext uri="{FF2B5EF4-FFF2-40B4-BE49-F238E27FC236}">
-                <a16:creationId xmlns:a16="http://schemas.microsoft.com/office/drawing/2014/main" id="{0C2DEAAA-983E-40A8-ABB7-ACC1A6BA213D}"/>
+                <a16:creationId xmlns:a16="http://schemas.microsoft.com/office/drawing/2014/main" xmlns="" id="{0C2DEAAA-983E-40A8-ABB7-ACC1A6BA213D}"/>
               </a:ext>
             </a:extLst>
           </p:cNvPr>
@@ -13340,6 +13453,13 @@
   <p:clrMapOvr>
     <a:masterClrMapping/>
   </p:clrMapOvr>
+  <p:timing>
+    <p:tnLst>
+      <p:par>
+        <p:cTn id="1" dur="indefinite" restart="never" nodeType="tmRoot"/>
+      </p:par>
+    </p:tnLst>
+  </p:timing>
 </p:sld>
 </file>
 
@@ -13404,7 +13524,7 @@
           <p:cNvPr id="3" name="CaixaDeTexto 2">
             <a:extLst>
               <a:ext uri="{FF2B5EF4-FFF2-40B4-BE49-F238E27FC236}">
-                <a16:creationId xmlns:a16="http://schemas.microsoft.com/office/drawing/2014/main" id="{0C2DEAAA-983E-40A8-ABB7-ACC1A6BA213D}"/>
+                <a16:creationId xmlns:a16="http://schemas.microsoft.com/office/drawing/2014/main" xmlns="" id="{0C2DEAAA-983E-40A8-ABB7-ACC1A6BA213D}"/>
               </a:ext>
             </a:extLst>
           </p:cNvPr>
@@ -13475,7 +13595,7 @@
           <p:cNvPr id="6" name="Picture 4" descr="Resultado de imagem para post it agile">
             <a:extLst>
               <a:ext uri="{FF2B5EF4-FFF2-40B4-BE49-F238E27FC236}">
-                <a16:creationId xmlns:a16="http://schemas.microsoft.com/office/drawing/2014/main" id="{2C09AE4E-9C18-45E9-A78B-CC50E68CEA33}"/>
+                <a16:creationId xmlns:a16="http://schemas.microsoft.com/office/drawing/2014/main" xmlns="" id="{2C09AE4E-9C18-45E9-A78B-CC50E68CEA33}"/>
               </a:ext>
             </a:extLst>
           </p:cNvPr>
@@ -16487,6 +16607,13 @@
   <p:clrMapOvr>
     <a:masterClrMapping/>
   </p:clrMapOvr>
+  <p:timing>
+    <p:tnLst>
+      <p:par>
+        <p:cTn id="1" dur="indefinite" restart="never" nodeType="tmRoot"/>
+      </p:par>
+    </p:tnLst>
+  </p:timing>
 </p:sld>
 </file>
 
@@ -16512,7 +16639,7 @@
           <p:cNvPr id="3" name="CaixaDeTexto 2">
             <a:extLst>
               <a:ext uri="{FF2B5EF4-FFF2-40B4-BE49-F238E27FC236}">
-                <a16:creationId xmlns:a16="http://schemas.microsoft.com/office/drawing/2014/main" id="{0C2DEAAA-983E-40A8-ABB7-ACC1A6BA213D}"/>
+                <a16:creationId xmlns:a16="http://schemas.microsoft.com/office/drawing/2014/main" xmlns="" id="{0C2DEAAA-983E-40A8-ABB7-ACC1A6BA213D}"/>
               </a:ext>
             </a:extLst>
           </p:cNvPr>
@@ -16556,7 +16683,7 @@
           <p:cNvPr id="8" name="Imagem 7">
             <a:extLst>
               <a:ext uri="{FF2B5EF4-FFF2-40B4-BE49-F238E27FC236}">
-                <a16:creationId xmlns:a16="http://schemas.microsoft.com/office/drawing/2014/main" id="{B190011C-5C28-4A03-96DF-B2CD039E3403}"/>
+                <a16:creationId xmlns:a16="http://schemas.microsoft.com/office/drawing/2014/main" xmlns="" id="{B190011C-5C28-4A03-96DF-B2CD039E3403}"/>
               </a:ext>
             </a:extLst>
           </p:cNvPr>
@@ -16586,7 +16713,7 @@
           <p:cNvPr id="6" name="Imagem 5">
             <a:extLst>
               <a:ext uri="{FF2B5EF4-FFF2-40B4-BE49-F238E27FC236}">
-                <a16:creationId xmlns:a16="http://schemas.microsoft.com/office/drawing/2014/main" id="{FB994063-7E59-49AB-9F59-2F045F06C2F6}"/>
+                <a16:creationId xmlns:a16="http://schemas.microsoft.com/office/drawing/2014/main" xmlns="" id="{FB994063-7E59-49AB-9F59-2F045F06C2F6}"/>
               </a:ext>
             </a:extLst>
           </p:cNvPr>
@@ -16616,7 +16743,7 @@
           <p:cNvPr id="10" name="Imagem 9">
             <a:extLst>
               <a:ext uri="{FF2B5EF4-FFF2-40B4-BE49-F238E27FC236}">
-                <a16:creationId xmlns:a16="http://schemas.microsoft.com/office/drawing/2014/main" id="{3DBF1805-44FE-4755-807B-34096F007D73}"/>
+                <a16:creationId xmlns:a16="http://schemas.microsoft.com/office/drawing/2014/main" xmlns="" id="{3DBF1805-44FE-4755-807B-34096F007D73}"/>
               </a:ext>
             </a:extLst>
           </p:cNvPr>
@@ -16646,7 +16773,7 @@
           <p:cNvPr id="13" name="Shape 179">
             <a:extLst>
               <a:ext uri="{FF2B5EF4-FFF2-40B4-BE49-F238E27FC236}">
-                <a16:creationId xmlns:a16="http://schemas.microsoft.com/office/drawing/2014/main" id="{AFF47A74-FEC7-459E-9EC1-27A0B0B68D59}"/>
+                <a16:creationId xmlns:a16="http://schemas.microsoft.com/office/drawing/2014/main" xmlns="" id="{AFF47A74-FEC7-459E-9EC1-27A0B0B68D59}"/>
               </a:ext>
             </a:extLst>
           </p:cNvPr>
@@ -21489,6 +21616,13 @@
   <p:clrMapOvr>
     <a:masterClrMapping/>
   </p:clrMapOvr>
+  <p:timing>
+    <p:tnLst>
+      <p:par>
+        <p:cTn id="1" dur="indefinite" restart="never" nodeType="tmRoot"/>
+      </p:par>
+    </p:tnLst>
+  </p:timing>
 </p:sld>
 </file>
 
@@ -21553,7 +21687,7 @@
           <p:cNvPr id="3" name="CaixaDeTexto 2">
             <a:extLst>
               <a:ext uri="{FF2B5EF4-FFF2-40B4-BE49-F238E27FC236}">
-                <a16:creationId xmlns:a16="http://schemas.microsoft.com/office/drawing/2014/main" id="{0C2DEAAA-983E-40A8-ABB7-ACC1A6BA213D}"/>
+                <a16:creationId xmlns:a16="http://schemas.microsoft.com/office/drawing/2014/main" xmlns="" id="{0C2DEAAA-983E-40A8-ABB7-ACC1A6BA213D}"/>
               </a:ext>
             </a:extLst>
           </p:cNvPr>
@@ -21624,7 +21758,7 @@
           <p:cNvPr id="4" name="Imagem 3">
             <a:extLst>
               <a:ext uri="{FF2B5EF4-FFF2-40B4-BE49-F238E27FC236}">
-                <a16:creationId xmlns:a16="http://schemas.microsoft.com/office/drawing/2014/main" id="{3B473007-741D-4A48-98E7-22E071A2B579}"/>
+                <a16:creationId xmlns:a16="http://schemas.microsoft.com/office/drawing/2014/main" xmlns="" id="{3B473007-741D-4A48-98E7-22E071A2B579}"/>
               </a:ext>
             </a:extLst>
           </p:cNvPr>

</xml_diff>

<commit_message>
slides, roteiro e remoção do alpha
</commit_message>
<xml_diff>
--- a/SeminarioAndamento.pptx
+++ b/SeminarioAndamento.pptx
@@ -27,11 +27,11 @@
   <p:notesSz cx="6858000" cy="9144000"/>
   <p:embeddedFontLst>
     <p:embeddedFont>
-      <p:font typeface="Sniglet" panose="020B0604020202020204" charset="0"/>
+      <p:font typeface="Walter Turncoat" panose="020B0604020202020204" charset="0"/>
       <p:regular r:id="rId17"/>
     </p:embeddedFont>
     <p:embeddedFont>
-      <p:font typeface="Walter Turncoat" panose="020B0604020202020204" charset="0"/>
+      <p:font typeface="Sniglet" panose="020B0604020202020204" charset="0"/>
       <p:regular r:id="rId18"/>
     </p:embeddedFont>
   </p:embeddedFontLst>
@@ -3568,17 +3568,9 @@
             <a:br>
               <a:rPr lang="pt-BR" sz="3600" dirty="0"/>
             </a:br>
-            <a:r>
-              <a:rPr lang="pt-BR" sz="3600" dirty="0"/>
-              <a:t/>
-            </a:r>
             <a:br>
               <a:rPr lang="pt-BR" sz="3600" dirty="0"/>
             </a:br>
-            <a:r>
-              <a:rPr lang="pt-BR" sz="3600" dirty="0"/>
-              <a:t/>
-            </a:r>
             <a:br>
               <a:rPr lang="pt-BR" sz="3600" dirty="0"/>
             </a:br>
@@ -3595,13 +3587,6 @@
   <p:clrMapOvr>
     <a:masterClrMapping/>
   </p:clrMapOvr>
-  <p:timing>
-    <p:tnLst>
-      <p:par>
-        <p:cTn id="1" dur="indefinite" restart="never" nodeType="tmRoot"/>
-      </p:par>
-    </p:tnLst>
-  </p:timing>
 </p:sld>
 </file>
 
@@ -3666,7 +3651,7 @@
           <p:cNvPr id="3" name="CaixaDeTexto 2">
             <a:extLst>
               <a:ext uri="{FF2B5EF4-FFF2-40B4-BE49-F238E27FC236}">
-                <a16:creationId xmlns="" xmlns:a16="http://schemas.microsoft.com/office/drawing/2014/main" id="{0C2DEAAA-983E-40A8-ABB7-ACC1A6BA213D}"/>
+                <a16:creationId xmlns:a16="http://schemas.microsoft.com/office/drawing/2014/main" id="{0C2DEAAA-983E-40A8-ABB7-ACC1A6BA213D}"/>
               </a:ext>
             </a:extLst>
           </p:cNvPr>
@@ -3675,8 +3660,8 @@
         </p:nvSpPr>
         <p:spPr>
           <a:xfrm>
-            <a:off x="452565" y="1257170"/>
-            <a:ext cx="8250865" cy="2862322"/>
+            <a:off x="452567" y="1018661"/>
+            <a:ext cx="8250865" cy="3693319"/>
           </a:xfrm>
           <a:prstGeom prst="rect">
             <a:avLst/>
@@ -3694,7 +3679,7 @@
               <a:buChar char="•"/>
             </a:pPr>
             <a:r>
-              <a:rPr lang="pt-BR" sz="2000" dirty="0">
+              <a:rPr lang="pt-BR" sz="1800" dirty="0">
                 <a:solidFill>
                   <a:schemeClr val="bg1"/>
                 </a:solidFill>
@@ -3708,7 +3693,7 @@
               <a:buFont typeface="Arial" panose="020B0604020202020204" pitchFamily="34" charset="0"/>
               <a:buChar char="•"/>
             </a:pPr>
-            <a:endParaRPr lang="pt-BR" sz="2000" dirty="0">
+            <a:endParaRPr lang="pt-BR" sz="1800" dirty="0">
               <a:solidFill>
                 <a:schemeClr val="bg1"/>
               </a:solidFill>
@@ -3721,15 +3706,15 @@
               <a:buChar char="•"/>
             </a:pPr>
             <a:r>
-              <a:rPr lang="pt-BR" sz="2000" dirty="0" err="1">
+              <a:rPr lang="pt-BR" sz="1800" dirty="0" err="1">
                 <a:solidFill>
                   <a:schemeClr val="bg1"/>
                 </a:solidFill>
                 <a:latin typeface="Sniglet" panose="020B0604020202020204" charset="0"/>
               </a:rPr>
-              <a:t>JQuery</a:t>
+              <a:t>Jquery</a:t>
             </a:r>
-            <a:endParaRPr lang="pt-BR" sz="2000" dirty="0">
+            <a:endParaRPr lang="pt-BR" sz="1800" dirty="0">
               <a:solidFill>
                 <a:schemeClr val="bg1"/>
               </a:solidFill>
@@ -3741,7 +3726,7 @@
               <a:buFont typeface="Arial" panose="020B0604020202020204" pitchFamily="34" charset="0"/>
               <a:buChar char="•"/>
             </a:pPr>
-            <a:endParaRPr lang="pt-BR" sz="2000" dirty="0">
+            <a:endParaRPr lang="pt-BR" sz="1800" dirty="0">
               <a:solidFill>
                 <a:schemeClr val="bg1"/>
               </a:solidFill>
@@ -3754,7 +3739,34 @@
               <a:buChar char="•"/>
             </a:pPr>
             <a:r>
-              <a:rPr lang="pt-BR" sz="2000" dirty="0">
+              <a:rPr lang="pt-BR" sz="1800" dirty="0">
+                <a:solidFill>
+                  <a:schemeClr val="bg1"/>
+                </a:solidFill>
+                <a:latin typeface="Sniglet" panose="020B0604020202020204" charset="0"/>
+              </a:rPr>
+              <a:t>Materialize</a:t>
+            </a:r>
+          </a:p>
+          <a:p>
+            <a:pPr marL="342900" lvl="8" indent="-342900">
+              <a:buFont typeface="Arial" panose="020B0604020202020204" pitchFamily="34" charset="0"/>
+              <a:buChar char="•"/>
+            </a:pPr>
+            <a:endParaRPr lang="pt-BR" sz="1800" dirty="0">
+              <a:solidFill>
+                <a:schemeClr val="bg1"/>
+              </a:solidFill>
+              <a:latin typeface="Sniglet" panose="020B0604020202020204" charset="0"/>
+            </a:endParaRPr>
+          </a:p>
+          <a:p>
+            <a:pPr marL="342900" lvl="8" indent="-342900">
+              <a:buFont typeface="Arial" panose="020B0604020202020204" pitchFamily="34" charset="0"/>
+              <a:buChar char="•"/>
+            </a:pPr>
+            <a:r>
+              <a:rPr lang="pt-BR" sz="1800" dirty="0">
                 <a:solidFill>
                   <a:schemeClr val="bg1"/>
                 </a:solidFill>
@@ -3768,7 +3780,7 @@
               <a:buFont typeface="Arial" panose="020B0604020202020204" pitchFamily="34" charset="0"/>
               <a:buChar char="•"/>
             </a:pPr>
-            <a:endParaRPr lang="pt-BR" sz="2000" dirty="0">
+            <a:endParaRPr lang="pt-BR" sz="1800" dirty="0">
               <a:solidFill>
                 <a:schemeClr val="bg1"/>
               </a:solidFill>
@@ -3781,18 +3793,27 @@
               <a:buChar char="•"/>
             </a:pPr>
             <a:r>
-              <a:rPr lang="pt-BR" sz="2000" dirty="0">
+              <a:rPr lang="pt-BR" sz="1800" dirty="0" err="1">
                 <a:solidFill>
                   <a:schemeClr val="bg1"/>
                 </a:solidFill>
                 <a:latin typeface="Sniglet" panose="020B0604020202020204" charset="0"/>
               </a:rPr>
-              <a:t>Frameworks</a:t>
+              <a:t>CodeIgniter</a:t>
             </a:r>
+            <a:endParaRPr lang="pt-BR" sz="1800" dirty="0">
+              <a:solidFill>
+                <a:schemeClr val="bg1"/>
+              </a:solidFill>
+              <a:latin typeface="Sniglet" panose="020B0604020202020204" charset="0"/>
+            </a:endParaRPr>
           </a:p>
           <a:p>
-            <a:pPr lvl="8"/>
-            <a:endParaRPr lang="pt-BR" sz="2000" dirty="0">
+            <a:pPr marL="342900" lvl="8" indent="-342900">
+              <a:buFont typeface="Arial" panose="020B0604020202020204" pitchFamily="34" charset="0"/>
+              <a:buChar char="•"/>
+            </a:pPr>
+            <a:endParaRPr lang="pt-BR" sz="1800" dirty="0">
               <a:solidFill>
                 <a:schemeClr val="bg1"/>
               </a:solidFill>
@@ -3805,7 +3826,40 @@
               <a:buChar char="•"/>
             </a:pPr>
             <a:r>
-              <a:rPr lang="pt-BR" sz="2000" dirty="0">
+              <a:rPr lang="pt-BR" sz="1800" dirty="0" err="1">
+                <a:solidFill>
+                  <a:schemeClr val="bg1"/>
+                </a:solidFill>
+                <a:latin typeface="Sniglet" panose="020B0604020202020204" charset="0"/>
+              </a:rPr>
+              <a:t>Quill</a:t>
+            </a:r>
+            <a:r>
+              <a:rPr lang="pt-BR" sz="1800" dirty="0">
+                <a:solidFill>
+                  <a:schemeClr val="bg1"/>
+                </a:solidFill>
+                <a:latin typeface="Sniglet" panose="020B0604020202020204" charset="0"/>
+              </a:rPr>
+              <a:t> JS</a:t>
+            </a:r>
+          </a:p>
+          <a:p>
+            <a:pPr lvl="8"/>
+            <a:endParaRPr lang="pt-BR" sz="1800" dirty="0">
+              <a:solidFill>
+                <a:schemeClr val="bg1"/>
+              </a:solidFill>
+              <a:latin typeface="Sniglet" panose="020B0604020202020204" charset="0"/>
+            </a:endParaRPr>
+          </a:p>
+          <a:p>
+            <a:pPr marL="342900" lvl="8" indent="-342900">
+              <a:buFont typeface="Arial" panose="020B0604020202020204" pitchFamily="34" charset="0"/>
+              <a:buChar char="•"/>
+            </a:pPr>
+            <a:r>
+              <a:rPr lang="pt-BR" sz="1800" dirty="0">
                 <a:solidFill>
                   <a:schemeClr val="bg1"/>
                 </a:solidFill>
@@ -3821,7 +3875,7 @@
           <p:cNvPr id="2054" name="Picture 6" descr="Resultado de imagem para Jquery">
             <a:extLst>
               <a:ext uri="{FF2B5EF4-FFF2-40B4-BE49-F238E27FC236}">
-                <a16:creationId xmlns="" xmlns:a16="http://schemas.microsoft.com/office/drawing/2014/main" id="{AB8B9431-A6FA-4393-8637-626272F7E4B4}"/>
+                <a16:creationId xmlns:a16="http://schemas.microsoft.com/office/drawing/2014/main" id="{AB8B9431-A6FA-4393-8637-626272F7E4B4}"/>
               </a:ext>
             </a:extLst>
           </p:cNvPr>
@@ -3868,7 +3922,7 @@
           <p:cNvPr id="2056" name="Picture 8" descr="Resultado de imagem para MySql">
             <a:extLst>
               <a:ext uri="{FF2B5EF4-FFF2-40B4-BE49-F238E27FC236}">
-                <a16:creationId xmlns="" xmlns:a16="http://schemas.microsoft.com/office/drawing/2014/main" id="{6220C71E-ABA5-4428-9749-4F91E4E41AC8}"/>
+                <a16:creationId xmlns:a16="http://schemas.microsoft.com/office/drawing/2014/main" id="{6220C71E-ABA5-4428-9749-4F91E4E41AC8}"/>
               </a:ext>
             </a:extLst>
           </p:cNvPr>
@@ -3892,7 +3946,7 @@
         </p:blipFill>
         <p:spPr bwMode="auto">
           <a:xfrm>
-            <a:off x="1818803" y="3239753"/>
+            <a:off x="3020329" y="3074835"/>
             <a:ext cx="3115340" cy="1612296"/>
           </a:xfrm>
           <a:prstGeom prst="rect">
@@ -3915,7 +3969,7 @@
           <p:cNvPr id="2066" name="Picture 18" descr="Resultado de imagem para materialize logo">
             <a:extLst>
               <a:ext uri="{FF2B5EF4-FFF2-40B4-BE49-F238E27FC236}">
-                <a16:creationId xmlns="" xmlns:a16="http://schemas.microsoft.com/office/drawing/2014/main" id="{B6834BF9-8851-4900-BD3B-975A3876A473}"/>
+                <a16:creationId xmlns:a16="http://schemas.microsoft.com/office/drawing/2014/main" id="{B6834BF9-8851-4900-BD3B-975A3876A473}"/>
               </a:ext>
             </a:extLst>
           </p:cNvPr>
@@ -4019,7 +4073,7 @@
         </p:blipFill>
         <p:spPr bwMode="auto">
           <a:xfrm>
-            <a:off x="5770112" y="2954327"/>
+            <a:off x="6762662" y="2954327"/>
             <a:ext cx="1853313" cy="1853313"/>
           </a:xfrm>
           <a:prstGeom prst="rect">
@@ -7166,13 +7220,6 @@
   <p:clrMapOvr>
     <a:masterClrMapping/>
   </p:clrMapOvr>
-  <p:timing>
-    <p:tnLst>
-      <p:par>
-        <p:cTn id="1" dur="indefinite" restart="never" nodeType="tmRoot"/>
-      </p:par>
-    </p:tnLst>
-  </p:timing>
 </p:sld>
 </file>
 
@@ -10050,13 +10097,6 @@
   <p:clrMapOvr>
     <a:masterClrMapping/>
   </p:clrMapOvr>
-  <p:timing>
-    <p:tnLst>
-      <p:par>
-        <p:cTn id="1" dur="indefinite" restart="never" nodeType="tmRoot"/>
-      </p:par>
-    </p:tnLst>
-  </p:timing>
 </p:sld>
 </file>
 
@@ -10121,7 +10161,7 @@
           <p:cNvPr id="3" name="CaixaDeTexto 2">
             <a:extLst>
               <a:ext uri="{FF2B5EF4-FFF2-40B4-BE49-F238E27FC236}">
-                <a16:creationId xmlns="" xmlns:a16="http://schemas.microsoft.com/office/drawing/2014/main" id="{0C2DEAAA-983E-40A8-ABB7-ACC1A6BA213D}"/>
+                <a16:creationId xmlns:a16="http://schemas.microsoft.com/office/drawing/2014/main" id="{0C2DEAAA-983E-40A8-ABB7-ACC1A6BA213D}"/>
               </a:ext>
             </a:extLst>
           </p:cNvPr>
@@ -10131,7 +10171,7 @@
         <p:spPr>
           <a:xfrm>
             <a:off x="452567" y="1676724"/>
-            <a:ext cx="8250865" cy="400110"/>
+            <a:ext cx="8250865" cy="2246769"/>
           </a:xfrm>
           <a:prstGeom prst="rect">
             <a:avLst/>
@@ -10155,7 +10195,88 @@
                 </a:solidFill>
                 <a:latin typeface="Sniglet" panose="020B0604020202020204" charset="0"/>
               </a:rPr>
-              <a:t>Ainda não sei o que vai faltar ter feito depois das férias</a:t>
+              <a:t>Concluir o gerenciamento de grupos</a:t>
+            </a:r>
+          </a:p>
+          <a:p>
+            <a:pPr marL="342900" lvl="8" indent="-342900">
+              <a:buFont typeface="Arial" panose="020B0604020202020204" pitchFamily="34" charset="0"/>
+              <a:buChar char="•"/>
+            </a:pPr>
+            <a:endParaRPr lang="pt-BR" sz="2000" dirty="0">
+              <a:solidFill>
+                <a:schemeClr val="bg1"/>
+              </a:solidFill>
+              <a:latin typeface="Sniglet" panose="020B0604020202020204" charset="0"/>
+            </a:endParaRPr>
+          </a:p>
+          <a:p>
+            <a:pPr marL="342900" lvl="8" indent="-342900">
+              <a:buFont typeface="Arial" panose="020B0604020202020204" pitchFamily="34" charset="0"/>
+              <a:buChar char="•"/>
+            </a:pPr>
+            <a:r>
+              <a:rPr lang="pt-BR" sz="2000" dirty="0">
+                <a:solidFill>
+                  <a:schemeClr val="bg1"/>
+                </a:solidFill>
+                <a:latin typeface="Sniglet" panose="020B0604020202020204" charset="0"/>
+              </a:rPr>
+              <a:t>Gerenciar projetos em grupo</a:t>
+            </a:r>
+          </a:p>
+          <a:p>
+            <a:pPr marL="342900" lvl="8" indent="-342900">
+              <a:buFont typeface="Arial" panose="020B0604020202020204" pitchFamily="34" charset="0"/>
+              <a:buChar char="•"/>
+            </a:pPr>
+            <a:endParaRPr lang="pt-BR" sz="2000" dirty="0">
+              <a:solidFill>
+                <a:schemeClr val="bg1"/>
+              </a:solidFill>
+              <a:latin typeface="Sniglet" panose="020B0604020202020204" charset="0"/>
+            </a:endParaRPr>
+          </a:p>
+          <a:p>
+            <a:pPr marL="342900" lvl="8" indent="-342900">
+              <a:buFont typeface="Arial" panose="020B0604020202020204" pitchFamily="34" charset="0"/>
+              <a:buChar char="•"/>
+            </a:pPr>
+            <a:r>
+              <a:rPr lang="pt-BR" sz="2000" dirty="0">
+                <a:solidFill>
+                  <a:schemeClr val="bg1"/>
+                </a:solidFill>
+                <a:latin typeface="Sniglet" panose="020B0604020202020204" charset="0"/>
+              </a:rPr>
+              <a:t>Perfis</a:t>
+            </a:r>
+          </a:p>
+          <a:p>
+            <a:pPr marL="342900" lvl="8" indent="-342900">
+              <a:buFont typeface="Arial" panose="020B0604020202020204" pitchFamily="34" charset="0"/>
+              <a:buChar char="•"/>
+            </a:pPr>
+            <a:endParaRPr lang="pt-BR" sz="2000" dirty="0">
+              <a:solidFill>
+                <a:schemeClr val="bg1"/>
+              </a:solidFill>
+              <a:latin typeface="Sniglet" panose="020B0604020202020204" charset="0"/>
+            </a:endParaRPr>
+          </a:p>
+          <a:p>
+            <a:pPr marL="342900" lvl="8" indent="-342900">
+              <a:buFont typeface="Arial" panose="020B0604020202020204" pitchFamily="34" charset="0"/>
+              <a:buChar char="•"/>
+            </a:pPr>
+            <a:r>
+              <a:rPr lang="pt-BR" sz="2000" dirty="0">
+                <a:solidFill>
+                  <a:schemeClr val="bg1"/>
+                </a:solidFill>
+                <a:latin typeface="Sniglet" panose="020B0604020202020204" charset="0"/>
+              </a:rPr>
+              <a:t>Tabelas de planejamento</a:t>
             </a:r>
           </a:p>
         </p:txBody>
@@ -10170,13 +10291,6 @@
   <p:clrMapOvr>
     <a:masterClrMapping/>
   </p:clrMapOvr>
-  <p:timing>
-    <p:tnLst>
-      <p:par>
-        <p:cTn id="1" dur="indefinite" restart="never" nodeType="tmRoot"/>
-      </p:par>
-    </p:tnLst>
-  </p:timing>
 </p:sld>
 </file>
 
@@ -10235,17 +10349,9 @@
             <a:br>
               <a:rPr lang="pt-BR" sz="3600" dirty="0"/>
             </a:br>
-            <a:r>
-              <a:rPr lang="pt-BR" sz="3600" dirty="0"/>
-              <a:t/>
-            </a:r>
             <a:br>
               <a:rPr lang="pt-BR" sz="3600" dirty="0"/>
             </a:br>
-            <a:r>
-              <a:rPr lang="pt-BR" sz="3600" dirty="0"/>
-              <a:t/>
-            </a:r>
             <a:br>
               <a:rPr lang="pt-BR" sz="3600" dirty="0"/>
             </a:br>
@@ -10267,13 +10373,6 @@
   <p:clrMapOvr>
     <a:masterClrMapping/>
   </p:clrMapOvr>
-  <p:timing>
-    <p:tnLst>
-      <p:par>
-        <p:cTn id="1" dur="indefinite" restart="never" nodeType="tmRoot"/>
-      </p:par>
-    </p:tnLst>
-  </p:timing>
 </p:sld>
 </file>
 
@@ -13146,13 +13245,6 @@
   <p:clrMapOvr>
     <a:masterClrMapping/>
   </p:clrMapOvr>
-  <p:timing>
-    <p:tnLst>
-      <p:par>
-        <p:cTn id="1" dur="indefinite" restart="never" nodeType="tmRoot"/>
-      </p:par>
-    </p:tnLst>
-  </p:timing>
 </p:sld>
 </file>
 
@@ -13217,7 +13309,7 @@
           <p:cNvPr id="3" name="CaixaDeTexto 2">
             <a:extLst>
               <a:ext uri="{FF2B5EF4-FFF2-40B4-BE49-F238E27FC236}">
-                <a16:creationId xmlns="" xmlns:a16="http://schemas.microsoft.com/office/drawing/2014/main" id="{0C2DEAAA-983E-40A8-ABB7-ACC1A6BA213D}"/>
+                <a16:creationId xmlns:a16="http://schemas.microsoft.com/office/drawing/2014/main" id="{0C2DEAAA-983E-40A8-ABB7-ACC1A6BA213D}"/>
               </a:ext>
             </a:extLst>
           </p:cNvPr>
@@ -13227,7 +13319,7 @@
         <p:spPr>
           <a:xfrm>
             <a:off x="452567" y="1676724"/>
-            <a:ext cx="8250865" cy="1631216"/>
+            <a:ext cx="8250865" cy="1323439"/>
           </a:xfrm>
           <a:prstGeom prst="rect">
             <a:avLst/>
@@ -13245,22 +13337,13 @@
               <a:buChar char="•"/>
             </a:pPr>
             <a:r>
-              <a:rPr lang="pt-BR" sz="2000" dirty="0" smtClean="0">
+              <a:rPr lang="pt-BR" sz="2000" dirty="0">
                 <a:solidFill>
                   <a:schemeClr val="bg1"/>
                 </a:solidFill>
                 <a:latin typeface="Sniglet" panose="020B0604020202020204" charset="0"/>
               </a:rPr>
-              <a:t>Acompanhamento dos projetos de </a:t>
-            </a:r>
-            <a:r>
-              <a:rPr lang="pt-BR" sz="2000" dirty="0" smtClean="0">
-                <a:solidFill>
-                  <a:schemeClr val="bg1"/>
-                </a:solidFill>
-                <a:latin typeface="Sniglet" panose="020B0604020202020204" charset="0"/>
-              </a:rPr>
-              <a:t>pesquisa</a:t>
+              <a:t>Acompanhamento dos projetos de pesquisa</a:t>
             </a:r>
           </a:p>
           <a:p>
@@ -13268,7 +13351,7 @@
               <a:buFont typeface="Arial" panose="020B0604020202020204" pitchFamily="34" charset="0"/>
               <a:buChar char="•"/>
             </a:pPr>
-            <a:endParaRPr lang="pt-BR" sz="2000" dirty="0" smtClean="0">
+            <a:endParaRPr lang="pt-BR" sz="2000" dirty="0">
               <a:solidFill>
                 <a:schemeClr val="bg1"/>
               </a:solidFill>
@@ -13281,7 +13364,7 @@
               <a:buChar char="•"/>
             </a:pPr>
             <a:r>
-              <a:rPr lang="pt-BR" sz="2000" dirty="0" smtClean="0">
+              <a:rPr lang="pt-BR" sz="2000" dirty="0">
                 <a:solidFill>
                   <a:schemeClr val="bg1"/>
                 </a:solidFill>
@@ -13296,7 +13379,7 @@
               <a:buChar char="•"/>
             </a:pPr>
             <a:r>
-              <a:rPr lang="pt-BR" sz="2000" dirty="0" smtClean="0">
+              <a:rPr lang="pt-BR" sz="2000" dirty="0">
                 <a:solidFill>
                   <a:schemeClr val="bg1"/>
                 </a:solidFill>
@@ -13305,27 +13388,6 @@
               <a:t>Definição de atividades a serem desenvolvidas</a:t>
             </a:r>
           </a:p>
-          <a:p>
-            <a:pPr marL="342900" lvl="8" indent="-342900">
-              <a:buFont typeface="Arial" panose="020B0604020202020204" pitchFamily="34" charset="0"/>
-              <a:buChar char="•"/>
-            </a:pPr>
-            <a:r>
-              <a:rPr lang="pt-BR" sz="2000" dirty="0" smtClean="0">
-                <a:solidFill>
-                  <a:schemeClr val="bg1"/>
-                </a:solidFill>
-                <a:latin typeface="Sniglet" panose="020B0604020202020204" charset="0"/>
-              </a:rPr>
-              <a:t>Documentação das reuniões dos projetos</a:t>
-            </a:r>
-            <a:endParaRPr lang="pt-BR" sz="2000" dirty="0">
-              <a:solidFill>
-                <a:schemeClr val="bg1"/>
-              </a:solidFill>
-              <a:latin typeface="Sniglet" panose="020B0604020202020204" charset="0"/>
-            </a:endParaRPr>
-          </a:p>
         </p:txBody>
       </p:sp>
     </p:spTree>
@@ -13333,13 +13395,6 @@
   <p:clrMapOvr>
     <a:masterClrMapping/>
   </p:clrMapOvr>
-  <p:timing>
-    <p:tnLst>
-      <p:par>
-        <p:cTn id="1" dur="indefinite" restart="never" nodeType="tmRoot"/>
-      </p:par>
-    </p:tnLst>
-  </p:timing>
 </p:sld>
 </file>
 
@@ -13393,7 +13448,7 @@
             </a:pPr>
             <a:r>
               <a:rPr lang="pt-BR" dirty="0"/>
-              <a:t>Documentação</a:t>
+              <a:t>Documentação de testes</a:t>
             </a:r>
             <a:endParaRPr lang="en" dirty="0"/>
           </a:p>
@@ -13404,7 +13459,7 @@
           <p:cNvPr id="3" name="CaixaDeTexto 2">
             <a:extLst>
               <a:ext uri="{FF2B5EF4-FFF2-40B4-BE49-F238E27FC236}">
-                <a16:creationId xmlns="" xmlns:a16="http://schemas.microsoft.com/office/drawing/2014/main" id="{0C2DEAAA-983E-40A8-ABB7-ACC1A6BA213D}"/>
+                <a16:creationId xmlns:a16="http://schemas.microsoft.com/office/drawing/2014/main" id="{0C2DEAAA-983E-40A8-ABB7-ACC1A6BA213D}"/>
               </a:ext>
             </a:extLst>
           </p:cNvPr>
@@ -13507,13 +13562,6 @@
   <p:clrMapOvr>
     <a:masterClrMapping/>
   </p:clrMapOvr>
-  <p:timing>
-    <p:tnLst>
-      <p:par>
-        <p:cTn id="1" dur="indefinite" restart="never" nodeType="tmRoot"/>
-      </p:par>
-    </p:tnLst>
-  </p:timing>
 </p:sld>
 </file>
 
@@ -13578,7 +13626,7 @@
           <p:cNvPr id="3" name="CaixaDeTexto 2">
             <a:extLst>
               <a:ext uri="{FF2B5EF4-FFF2-40B4-BE49-F238E27FC236}">
-                <a16:creationId xmlns="" xmlns:a16="http://schemas.microsoft.com/office/drawing/2014/main" id="{0C2DEAAA-983E-40A8-ABB7-ACC1A6BA213D}"/>
+                <a16:creationId xmlns:a16="http://schemas.microsoft.com/office/drawing/2014/main" id="{0C2DEAAA-983E-40A8-ABB7-ACC1A6BA213D}"/>
               </a:ext>
             </a:extLst>
           </p:cNvPr>
@@ -13649,7 +13697,7 @@
           <p:cNvPr id="6" name="Picture 4" descr="Resultado de imagem para post it agile">
             <a:extLst>
               <a:ext uri="{FF2B5EF4-FFF2-40B4-BE49-F238E27FC236}">
-                <a16:creationId xmlns="" xmlns:a16="http://schemas.microsoft.com/office/drawing/2014/main" id="{2C09AE4E-9C18-45E9-A78B-CC50E68CEA33}"/>
+                <a16:creationId xmlns:a16="http://schemas.microsoft.com/office/drawing/2014/main" id="{2C09AE4E-9C18-45E9-A78B-CC50E68CEA33}"/>
               </a:ext>
             </a:extLst>
           </p:cNvPr>
@@ -13673,7 +13721,7 @@
         </p:blipFill>
         <p:spPr bwMode="auto">
           <a:xfrm>
-            <a:off x="2118565" y="1016839"/>
+            <a:off x="2118565" y="1133798"/>
             <a:ext cx="4918868" cy="3661824"/>
           </a:xfrm>
           <a:prstGeom prst="rect">
@@ -16661,13 +16709,6 @@
   <p:clrMapOvr>
     <a:masterClrMapping/>
   </p:clrMapOvr>
-  <p:timing>
-    <p:tnLst>
-      <p:par>
-        <p:cTn id="1" dur="indefinite" restart="never" nodeType="tmRoot"/>
-      </p:par>
-    </p:tnLst>
-  </p:timing>
 </p:sld>
 </file>
 
@@ -16693,7 +16734,7 @@
           <p:cNvPr id="3" name="CaixaDeTexto 2">
             <a:extLst>
               <a:ext uri="{FF2B5EF4-FFF2-40B4-BE49-F238E27FC236}">
-                <a16:creationId xmlns="" xmlns:a16="http://schemas.microsoft.com/office/drawing/2014/main" id="{0C2DEAAA-983E-40A8-ABB7-ACC1A6BA213D}"/>
+                <a16:creationId xmlns:a16="http://schemas.microsoft.com/office/drawing/2014/main" id="{0C2DEAAA-983E-40A8-ABB7-ACC1A6BA213D}"/>
               </a:ext>
             </a:extLst>
           </p:cNvPr>
@@ -16737,7 +16778,7 @@
           <p:cNvPr id="8" name="Imagem 7">
             <a:extLst>
               <a:ext uri="{FF2B5EF4-FFF2-40B4-BE49-F238E27FC236}">
-                <a16:creationId xmlns="" xmlns:a16="http://schemas.microsoft.com/office/drawing/2014/main" id="{B190011C-5C28-4A03-96DF-B2CD039E3403}"/>
+                <a16:creationId xmlns:a16="http://schemas.microsoft.com/office/drawing/2014/main" id="{B190011C-5C28-4A03-96DF-B2CD039E3403}"/>
               </a:ext>
             </a:extLst>
           </p:cNvPr>
@@ -16767,7 +16808,7 @@
           <p:cNvPr id="6" name="Imagem 5">
             <a:extLst>
               <a:ext uri="{FF2B5EF4-FFF2-40B4-BE49-F238E27FC236}">
-                <a16:creationId xmlns="" xmlns:a16="http://schemas.microsoft.com/office/drawing/2014/main" id="{FB994063-7E59-49AB-9F59-2F045F06C2F6}"/>
+                <a16:creationId xmlns:a16="http://schemas.microsoft.com/office/drawing/2014/main" id="{FB994063-7E59-49AB-9F59-2F045F06C2F6}"/>
               </a:ext>
             </a:extLst>
           </p:cNvPr>
@@ -16797,7 +16838,7 @@
           <p:cNvPr id="10" name="Imagem 9">
             <a:extLst>
               <a:ext uri="{FF2B5EF4-FFF2-40B4-BE49-F238E27FC236}">
-                <a16:creationId xmlns="" xmlns:a16="http://schemas.microsoft.com/office/drawing/2014/main" id="{3DBF1805-44FE-4755-807B-34096F007D73}"/>
+                <a16:creationId xmlns:a16="http://schemas.microsoft.com/office/drawing/2014/main" id="{3DBF1805-44FE-4755-807B-34096F007D73}"/>
               </a:ext>
             </a:extLst>
           </p:cNvPr>
@@ -16827,7 +16868,7 @@
           <p:cNvPr id="13" name="Shape 179">
             <a:extLst>
               <a:ext uri="{FF2B5EF4-FFF2-40B4-BE49-F238E27FC236}">
-                <a16:creationId xmlns="" xmlns:a16="http://schemas.microsoft.com/office/drawing/2014/main" id="{AFF47A74-FEC7-459E-9EC1-27A0B0B68D59}"/>
+                <a16:creationId xmlns:a16="http://schemas.microsoft.com/office/drawing/2014/main" id="{AFF47A74-FEC7-459E-9EC1-27A0B0B68D59}"/>
               </a:ext>
             </a:extLst>
           </p:cNvPr>
@@ -21670,13 +21711,6 @@
   <p:clrMapOvr>
     <a:masterClrMapping/>
   </p:clrMapOvr>
-  <p:timing>
-    <p:tnLst>
-      <p:par>
-        <p:cTn id="1" dur="indefinite" restart="never" nodeType="tmRoot"/>
-      </p:par>
-    </p:tnLst>
-  </p:timing>
 </p:sld>
 </file>
 
@@ -21741,7 +21775,7 @@
           <p:cNvPr id="3" name="CaixaDeTexto 2">
             <a:extLst>
               <a:ext uri="{FF2B5EF4-FFF2-40B4-BE49-F238E27FC236}">
-                <a16:creationId xmlns="" xmlns:a16="http://schemas.microsoft.com/office/drawing/2014/main" id="{0C2DEAAA-983E-40A8-ABB7-ACC1A6BA213D}"/>
+                <a16:creationId xmlns:a16="http://schemas.microsoft.com/office/drawing/2014/main" id="{0C2DEAAA-983E-40A8-ABB7-ACC1A6BA213D}"/>
               </a:ext>
             </a:extLst>
           </p:cNvPr>
@@ -21802,7 +21836,7 @@
                 </a:solidFill>
                 <a:latin typeface="Sniglet" panose="020B0604020202020204" charset="0"/>
               </a:rPr>
-              <a:t>Facilitar gerenciamento de documentação de testes e planejamento de atividades</a:t>
+              <a:t>Facilitar gerenciamento e organização de documentação de testes e planejamento de atividades</a:t>
             </a:r>
           </a:p>
         </p:txBody>
@@ -21812,7 +21846,7 @@
           <p:cNvPr id="4" name="Imagem 3">
             <a:extLst>
               <a:ext uri="{FF2B5EF4-FFF2-40B4-BE49-F238E27FC236}">
-                <a16:creationId xmlns="" xmlns:a16="http://schemas.microsoft.com/office/drawing/2014/main" id="{3B473007-741D-4A48-98E7-22E071A2B579}"/>
+                <a16:creationId xmlns:a16="http://schemas.microsoft.com/office/drawing/2014/main" id="{3B473007-741D-4A48-98E7-22E071A2B579}"/>
               </a:ext>
             </a:extLst>
           </p:cNvPr>
@@ -21829,7 +21863,7 @@
         </p:blipFill>
         <p:spPr>
           <a:xfrm>
-            <a:off x="1497488" y="244548"/>
+            <a:off x="1497488" y="422213"/>
             <a:ext cx="6161021" cy="4609481"/>
           </a:xfrm>
           <a:prstGeom prst="rect">

</xml_diff>

<commit_message>
apresentacao e imagem para exemplo
</commit_message>
<xml_diff>
--- a/SeminarioAndamento.pptx
+++ b/SeminarioAndamento.pptx
@@ -5,7 +5,7 @@
     <p:sldMasterId id="2147483657" r:id="rId1"/>
   </p:sldMasterIdLst>
   <p:notesMasterIdLst>
-    <p:notesMasterId r:id="rId16"/>
+    <p:notesMasterId r:id="rId14"/>
   </p:notesMasterIdLst>
   <p:sldIdLst>
     <p:sldId id="256" r:id="rId2"/>
@@ -19,20 +19,18 @@
     <p:sldId id="290" r:id="rId10"/>
     <p:sldId id="293" r:id="rId11"/>
     <p:sldId id="287" r:id="rId12"/>
-    <p:sldId id="288" r:id="rId13"/>
-    <p:sldId id="295" r:id="rId14"/>
-    <p:sldId id="294" r:id="rId15"/>
+    <p:sldId id="294" r:id="rId13"/>
   </p:sldIdLst>
   <p:sldSz cx="9144000" cy="5143500" type="screen16x9"/>
   <p:notesSz cx="6858000" cy="9144000"/>
   <p:embeddedFontLst>
     <p:embeddedFont>
       <p:font typeface="Walter Turncoat" panose="020B0604020202020204" charset="0"/>
-      <p:regular r:id="rId17"/>
+      <p:regular r:id="rId15"/>
     </p:embeddedFont>
     <p:embeddedFont>
       <p:font typeface="Sniglet" panose="020B0604020202020204" charset="0"/>
-      <p:regular r:id="rId18"/>
+      <p:regular r:id="rId16"/>
     </p:embeddedFont>
   </p:embeddedFontLst>
   <p:defaultTextStyle>
@@ -830,218 +828,6 @@
 </file>
 
 <file path=ppt/notesSlides/notesSlide12.xml><?xml version="1.0" encoding="utf-8"?>
-<p:notes xmlns:a="http://schemas.openxmlformats.org/drawingml/2006/main" xmlns:r="http://schemas.openxmlformats.org/officeDocument/2006/relationships" xmlns:p="http://schemas.openxmlformats.org/presentationml/2006/main" showMasterSp="0" showMasterPhAnim="0">
-  <p:cSld>
-    <p:spTree>
-      <p:nvGrpSpPr>
-        <p:cNvPr id="1" name="Shape 66"/>
-        <p:cNvGrpSpPr/>
-        <p:nvPr/>
-      </p:nvGrpSpPr>
-      <p:grpSpPr>
-        <a:xfrm>
-          <a:off x="0" y="0"/>
-          <a:ext cx="0" cy="0"/>
-          <a:chOff x="0" y="0"/>
-          <a:chExt cx="0" cy="0"/>
-        </a:xfrm>
-      </p:grpSpPr>
-      <p:sp>
-        <p:nvSpPr>
-          <p:cNvPr id="67" name="Shape 67"/>
-          <p:cNvSpPr>
-            <a:spLocks noGrp="1" noRot="1" noChangeAspect="1"/>
-          </p:cNvSpPr>
-          <p:nvPr>
-            <p:ph type="sldImg" idx="2"/>
-          </p:nvPr>
-        </p:nvSpPr>
-        <p:spPr>
-          <a:xfrm>
-            <a:off x="381000" y="685800"/>
-            <a:ext cx="6096000" cy="3429000"/>
-          </a:xfrm>
-          <a:custGeom>
-            <a:avLst/>
-            <a:gdLst/>
-            <a:ahLst/>
-            <a:cxnLst/>
-            <a:rect l="0" t="0" r="0" b="0"/>
-            <a:pathLst>
-              <a:path w="120000" h="120000" extrusionOk="0">
-                <a:moveTo>
-                  <a:pt x="0" y="0"/>
-                </a:moveTo>
-                <a:lnTo>
-                  <a:pt x="120000" y="0"/>
-                </a:lnTo>
-                <a:lnTo>
-                  <a:pt x="120000" y="120000"/>
-                </a:lnTo>
-                <a:lnTo>
-                  <a:pt x="0" y="120000"/>
-                </a:lnTo>
-                <a:close/>
-              </a:path>
-            </a:pathLst>
-          </a:custGeom>
-        </p:spPr>
-      </p:sp>
-      <p:sp>
-        <p:nvSpPr>
-          <p:cNvPr id="68" name="Shape 68"/>
-          <p:cNvSpPr txBox="1">
-            <a:spLocks noGrp="1"/>
-          </p:cNvSpPr>
-          <p:nvPr>
-            <p:ph type="body" idx="1"/>
-          </p:nvPr>
-        </p:nvSpPr>
-        <p:spPr>
-          <a:xfrm>
-            <a:off x="685800" y="4343400"/>
-            <a:ext cx="5486399" cy="4114800"/>
-          </a:xfrm>
-          <a:prstGeom prst="rect">
-            <a:avLst/>
-          </a:prstGeom>
-        </p:spPr>
-        <p:txBody>
-          <a:bodyPr lIns="91425" tIns="91425" rIns="91425" bIns="91425" anchor="t" anchorCtr="0">
-            <a:noAutofit/>
-          </a:bodyPr>
-          <a:lstStyle/>
-          <a:p>
-            <a:pPr lvl="0">
-              <a:spcBef>
-                <a:spcPts val="0"/>
-              </a:spcBef>
-              <a:buNone/>
-            </a:pPr>
-            <a:endParaRPr/>
-          </a:p>
-        </p:txBody>
-      </p:sp>
-    </p:spTree>
-    <p:extLst>
-      <p:ext uri="{BB962C8B-B14F-4D97-AF65-F5344CB8AC3E}">
-        <p14:creationId xmlns:p14="http://schemas.microsoft.com/office/powerpoint/2010/main" val="3250076530"/>
-      </p:ext>
-    </p:extLst>
-  </p:cSld>
-  <p:clrMapOvr>
-    <a:masterClrMapping/>
-  </p:clrMapOvr>
-</p:notes>
-</file>
-
-<file path=ppt/notesSlides/notesSlide13.xml><?xml version="1.0" encoding="utf-8"?>
-<p:notes xmlns:a="http://schemas.openxmlformats.org/drawingml/2006/main" xmlns:r="http://schemas.openxmlformats.org/officeDocument/2006/relationships" xmlns:p="http://schemas.openxmlformats.org/presentationml/2006/main" showMasterSp="0" showMasterPhAnim="0">
-  <p:cSld>
-    <p:spTree>
-      <p:nvGrpSpPr>
-        <p:cNvPr id="1" name="Shape 48"/>
-        <p:cNvGrpSpPr/>
-        <p:nvPr/>
-      </p:nvGrpSpPr>
-      <p:grpSpPr>
-        <a:xfrm>
-          <a:off x="0" y="0"/>
-          <a:ext cx="0" cy="0"/>
-          <a:chOff x="0" y="0"/>
-          <a:chExt cx="0" cy="0"/>
-        </a:xfrm>
-      </p:grpSpPr>
-      <p:sp>
-        <p:nvSpPr>
-          <p:cNvPr id="49" name="Shape 49"/>
-          <p:cNvSpPr>
-            <a:spLocks noGrp="1" noRot="1" noChangeAspect="1"/>
-          </p:cNvSpPr>
-          <p:nvPr>
-            <p:ph type="sldImg" idx="2"/>
-          </p:nvPr>
-        </p:nvSpPr>
-        <p:spPr>
-          <a:xfrm>
-            <a:off x="381000" y="685800"/>
-            <a:ext cx="6096000" cy="3429000"/>
-          </a:xfrm>
-          <a:custGeom>
-            <a:avLst/>
-            <a:gdLst/>
-            <a:ahLst/>
-            <a:cxnLst/>
-            <a:rect l="0" t="0" r="0" b="0"/>
-            <a:pathLst>
-              <a:path w="120000" h="120000" extrusionOk="0">
-                <a:moveTo>
-                  <a:pt x="0" y="0"/>
-                </a:moveTo>
-                <a:lnTo>
-                  <a:pt x="120000" y="0"/>
-                </a:lnTo>
-                <a:lnTo>
-                  <a:pt x="120000" y="120000"/>
-                </a:lnTo>
-                <a:lnTo>
-                  <a:pt x="0" y="120000"/>
-                </a:lnTo>
-                <a:close/>
-              </a:path>
-            </a:pathLst>
-          </a:custGeom>
-        </p:spPr>
-      </p:sp>
-      <p:sp>
-        <p:nvSpPr>
-          <p:cNvPr id="50" name="Shape 50"/>
-          <p:cNvSpPr txBox="1">
-            <a:spLocks noGrp="1"/>
-          </p:cNvSpPr>
-          <p:nvPr>
-            <p:ph type="body" idx="1"/>
-          </p:nvPr>
-        </p:nvSpPr>
-        <p:spPr>
-          <a:xfrm>
-            <a:off x="685800" y="4343400"/>
-            <a:ext cx="5486399" cy="4114800"/>
-          </a:xfrm>
-          <a:prstGeom prst="rect">
-            <a:avLst/>
-          </a:prstGeom>
-        </p:spPr>
-        <p:txBody>
-          <a:bodyPr lIns="91425" tIns="91425" rIns="91425" bIns="91425" anchor="t" anchorCtr="0">
-            <a:noAutofit/>
-          </a:bodyPr>
-          <a:lstStyle/>
-          <a:p>
-            <a:pPr lvl="0">
-              <a:spcBef>
-                <a:spcPts val="0"/>
-              </a:spcBef>
-              <a:buNone/>
-            </a:pPr>
-            <a:endParaRPr/>
-          </a:p>
-        </p:txBody>
-      </p:sp>
-    </p:spTree>
-    <p:extLst>
-      <p:ext uri="{BB962C8B-B14F-4D97-AF65-F5344CB8AC3E}">
-        <p14:creationId xmlns:p14="http://schemas.microsoft.com/office/powerpoint/2010/main" val="1689472091"/>
-      </p:ext>
-    </p:extLst>
-  </p:cSld>
-  <p:clrMapOvr>
-    <a:masterClrMapping/>
-  </p:clrMapOvr>
-</p:notes>
-</file>
-
-<file path=ppt/notesSlides/notesSlide14.xml><?xml version="1.0" encoding="utf-8"?>
 <p:notes xmlns:a="http://schemas.openxmlformats.org/drawingml/2006/main" xmlns:r="http://schemas.openxmlformats.org/officeDocument/2006/relationships" xmlns:p="http://schemas.openxmlformats.org/presentationml/2006/main" showMasterSp="0" showMasterPhAnim="0">
   <p:cSld>
     <p:spTree>
@@ -7228,3077 +7014,6 @@
   <p:cSld>
     <p:spTree>
       <p:nvGrpSpPr>
-        <p:cNvPr id="1" name="Shape 69"/>
-        <p:cNvGrpSpPr/>
-        <p:nvPr/>
-      </p:nvGrpSpPr>
-      <p:grpSpPr>
-        <a:xfrm>
-          <a:off x="0" y="0"/>
-          <a:ext cx="0" cy="0"/>
-          <a:chOff x="0" y="0"/>
-          <a:chExt cx="0" cy="0"/>
-        </a:xfrm>
-      </p:grpSpPr>
-      <p:sp>
-        <p:nvSpPr>
-          <p:cNvPr id="70" name="Shape 70"/>
-          <p:cNvSpPr txBox="1">
-            <a:spLocks noGrp="1"/>
-          </p:cNvSpPr>
-          <p:nvPr>
-            <p:ph type="ctrTitle"/>
-          </p:nvPr>
-        </p:nvSpPr>
-        <p:spPr>
-          <a:xfrm>
-            <a:off x="685800" y="1964342"/>
-            <a:ext cx="7772400" cy="1159799"/>
-          </a:xfrm>
-          <a:prstGeom prst="rect">
-            <a:avLst/>
-          </a:prstGeom>
-        </p:spPr>
-        <p:txBody>
-          <a:bodyPr lIns="91425" tIns="91425" rIns="91425" bIns="91425" anchor="b" anchorCtr="0">
-            <a:noAutofit/>
-          </a:bodyPr>
-          <a:lstStyle/>
-          <a:p>
-            <a:pPr lvl="0" rtl="0">
-              <a:spcBef>
-                <a:spcPts val="0"/>
-              </a:spcBef>
-              <a:buNone/>
-            </a:pPr>
-            <a:r>
-              <a:rPr lang="en" sz="6000" dirty="0"/>
-              <a:t>5.</a:t>
-            </a:r>
-          </a:p>
-          <a:p>
-            <a:pPr lvl="0" rtl="0">
-              <a:spcBef>
-                <a:spcPts val="0"/>
-              </a:spcBef>
-              <a:buNone/>
-            </a:pPr>
-            <a:endParaRPr lang="pt-BR" dirty="0"/>
-          </a:p>
-          <a:p>
-            <a:pPr lvl="0" rtl="0">
-              <a:spcBef>
-                <a:spcPts val="0"/>
-              </a:spcBef>
-              <a:buNone/>
-            </a:pPr>
-            <a:r>
-              <a:rPr lang="pt-BR" dirty="0"/>
-              <a:t>Próximos passos</a:t>
-            </a:r>
-            <a:endParaRPr lang="en" dirty="0"/>
-          </a:p>
-        </p:txBody>
-      </p:sp>
-      <p:sp>
-        <p:nvSpPr>
-          <p:cNvPr id="71" name="Shape 71"/>
-          <p:cNvSpPr txBox="1">
-            <a:spLocks noGrp="1"/>
-          </p:cNvSpPr>
-          <p:nvPr>
-            <p:ph type="subTitle" idx="1"/>
-          </p:nvPr>
-        </p:nvSpPr>
-        <p:spPr>
-          <a:xfrm>
-            <a:off x="685800" y="3144853"/>
-            <a:ext cx="7772400" cy="784799"/>
-          </a:xfrm>
-          <a:prstGeom prst="rect">
-            <a:avLst/>
-          </a:prstGeom>
-        </p:spPr>
-        <p:txBody>
-          <a:bodyPr lIns="91425" tIns="91425" rIns="91425" bIns="91425" anchor="t" anchorCtr="0">
-            <a:noAutofit/>
-          </a:bodyPr>
-          <a:lstStyle/>
-          <a:p>
-            <a:pPr lvl="0" rtl="0">
-              <a:spcBef>
-                <a:spcPts val="0"/>
-              </a:spcBef>
-              <a:buNone/>
-            </a:pPr>
-            <a:r>
-              <a:rPr lang="pt-BR" dirty="0"/>
-              <a:t>Próximas etapas do desenvolvimento</a:t>
-            </a:r>
-            <a:endParaRPr lang="en" dirty="0"/>
-          </a:p>
-        </p:txBody>
-      </p:sp>
-      <p:sp>
-        <p:nvSpPr>
-          <p:cNvPr id="72" name="Shape 72"/>
-          <p:cNvSpPr/>
-          <p:nvPr/>
-        </p:nvSpPr>
-        <p:spPr>
-          <a:xfrm>
-            <a:off x="3617074" y="256025"/>
-            <a:ext cx="1824692" cy="1702276"/>
-          </a:xfrm>
-          <a:custGeom>
-            <a:avLst/>
-            <a:gdLst/>
-            <a:ahLst/>
-            <a:cxnLst/>
-            <a:rect l="0" t="0" r="0" b="0"/>
-            <a:pathLst>
-              <a:path w="73112" h="68207" extrusionOk="0">
-                <a:moveTo>
-                  <a:pt x="46809" y="1210"/>
-                </a:moveTo>
-                <a:lnTo>
-                  <a:pt x="46886" y="1227"/>
-                </a:lnTo>
-                <a:lnTo>
-                  <a:pt x="46886" y="1227"/>
-                </a:lnTo>
-                <a:lnTo>
-                  <a:pt x="46866" y="1215"/>
-                </a:lnTo>
-                <a:lnTo>
-                  <a:pt x="46809" y="1210"/>
-                </a:lnTo>
-                <a:close/>
-                <a:moveTo>
-                  <a:pt x="35754" y="1982"/>
-                </a:moveTo>
-                <a:lnTo>
-                  <a:pt x="36320" y="2170"/>
-                </a:lnTo>
-                <a:lnTo>
-                  <a:pt x="36037" y="2170"/>
-                </a:lnTo>
-                <a:lnTo>
-                  <a:pt x="35660" y="2076"/>
-                </a:lnTo>
-                <a:lnTo>
-                  <a:pt x="35754" y="1982"/>
-                </a:lnTo>
-                <a:close/>
-                <a:moveTo>
-                  <a:pt x="42641" y="1321"/>
-                </a:moveTo>
-                <a:lnTo>
-                  <a:pt x="44622" y="1510"/>
-                </a:lnTo>
-                <a:lnTo>
-                  <a:pt x="46603" y="1793"/>
-                </a:lnTo>
-                <a:lnTo>
-                  <a:pt x="46226" y="1793"/>
-                </a:lnTo>
-                <a:lnTo>
-                  <a:pt x="46320" y="1982"/>
-                </a:lnTo>
-                <a:lnTo>
-                  <a:pt x="45660" y="1793"/>
-                </a:lnTo>
-                <a:lnTo>
-                  <a:pt x="44905" y="1699"/>
-                </a:lnTo>
-                <a:lnTo>
-                  <a:pt x="44905" y="1699"/>
-                </a:lnTo>
-                <a:lnTo>
-                  <a:pt x="45188" y="2076"/>
-                </a:lnTo>
-                <a:lnTo>
-                  <a:pt x="45282" y="2265"/>
-                </a:lnTo>
-                <a:lnTo>
-                  <a:pt x="45094" y="2265"/>
-                </a:lnTo>
-                <a:lnTo>
-                  <a:pt x="44716" y="2170"/>
-                </a:lnTo>
-                <a:lnTo>
-                  <a:pt x="43773" y="1793"/>
-                </a:lnTo>
-                <a:lnTo>
-                  <a:pt x="42641" y="1321"/>
-                </a:lnTo>
-                <a:close/>
-                <a:moveTo>
-                  <a:pt x="34622" y="5095"/>
-                </a:moveTo>
-                <a:lnTo>
-                  <a:pt x="34169" y="5151"/>
-                </a:lnTo>
-                <a:lnTo>
-                  <a:pt x="34169" y="5151"/>
-                </a:lnTo>
-                <a:lnTo>
-                  <a:pt x="34056" y="5189"/>
-                </a:lnTo>
-                <a:lnTo>
-                  <a:pt x="34622" y="5095"/>
-                </a:lnTo>
-                <a:close/>
-                <a:moveTo>
-                  <a:pt x="58490" y="6793"/>
-                </a:moveTo>
-                <a:lnTo>
-                  <a:pt x="59056" y="7453"/>
-                </a:lnTo>
-                <a:lnTo>
-                  <a:pt x="59087" y="7476"/>
-                </a:lnTo>
-                <a:lnTo>
-                  <a:pt x="58490" y="6793"/>
-                </a:lnTo>
-                <a:close/>
-                <a:moveTo>
-                  <a:pt x="56697" y="7736"/>
-                </a:moveTo>
-                <a:lnTo>
-                  <a:pt x="57358" y="8113"/>
-                </a:lnTo>
-                <a:lnTo>
-                  <a:pt x="57075" y="8113"/>
-                </a:lnTo>
-                <a:lnTo>
-                  <a:pt x="56697" y="7736"/>
-                </a:lnTo>
-                <a:close/>
-                <a:moveTo>
-                  <a:pt x="59810" y="8679"/>
-                </a:moveTo>
-                <a:lnTo>
-                  <a:pt x="60087" y="8956"/>
-                </a:lnTo>
-                <a:lnTo>
-                  <a:pt x="59905" y="8774"/>
-                </a:lnTo>
-                <a:lnTo>
-                  <a:pt x="59810" y="8679"/>
-                </a:lnTo>
-                <a:close/>
-                <a:moveTo>
-                  <a:pt x="57546" y="8019"/>
-                </a:moveTo>
-                <a:lnTo>
-                  <a:pt x="58395" y="8774"/>
-                </a:lnTo>
-                <a:lnTo>
-                  <a:pt x="59339" y="9434"/>
-                </a:lnTo>
-                <a:lnTo>
-                  <a:pt x="58490" y="8868"/>
-                </a:lnTo>
-                <a:lnTo>
-                  <a:pt x="57735" y="8208"/>
-                </a:lnTo>
-                <a:lnTo>
-                  <a:pt x="57546" y="8019"/>
-                </a:lnTo>
-                <a:close/>
-                <a:moveTo>
-                  <a:pt x="60282" y="9246"/>
-                </a:moveTo>
-                <a:lnTo>
-                  <a:pt x="60565" y="9812"/>
-                </a:lnTo>
-                <a:lnTo>
-                  <a:pt x="60282" y="9529"/>
-                </a:lnTo>
-                <a:lnTo>
-                  <a:pt x="60282" y="9340"/>
-                </a:lnTo>
-                <a:lnTo>
-                  <a:pt x="60282" y="9246"/>
-                </a:lnTo>
-                <a:close/>
-                <a:moveTo>
-                  <a:pt x="59999" y="8396"/>
-                </a:moveTo>
-                <a:lnTo>
-                  <a:pt x="60659" y="8774"/>
-                </a:lnTo>
-                <a:lnTo>
-                  <a:pt x="61131" y="9340"/>
-                </a:lnTo>
-                <a:lnTo>
-                  <a:pt x="61603" y="9906"/>
-                </a:lnTo>
-                <a:lnTo>
-                  <a:pt x="61886" y="10566"/>
-                </a:lnTo>
-                <a:lnTo>
-                  <a:pt x="60942" y="9434"/>
-                </a:lnTo>
-                <a:lnTo>
-                  <a:pt x="61320" y="10095"/>
-                </a:lnTo>
-                <a:lnTo>
-                  <a:pt x="59999" y="8396"/>
-                </a:lnTo>
-                <a:close/>
-                <a:moveTo>
-                  <a:pt x="63773" y="11132"/>
-                </a:moveTo>
-                <a:lnTo>
-                  <a:pt x="64537" y="12278"/>
-                </a:lnTo>
-                <a:lnTo>
-                  <a:pt x="64622" y="12359"/>
-                </a:lnTo>
-                <a:lnTo>
-                  <a:pt x="63773" y="11132"/>
-                </a:lnTo>
-                <a:close/>
-                <a:moveTo>
-                  <a:pt x="65093" y="14528"/>
-                </a:moveTo>
-                <a:lnTo>
-                  <a:pt x="65376" y="15189"/>
-                </a:lnTo>
-                <a:lnTo>
-                  <a:pt x="65659" y="15755"/>
-                </a:lnTo>
-                <a:lnTo>
-                  <a:pt x="66037" y="16981"/>
-                </a:lnTo>
-                <a:lnTo>
-                  <a:pt x="65659" y="16321"/>
-                </a:lnTo>
-                <a:lnTo>
-                  <a:pt x="65282" y="15377"/>
-                </a:lnTo>
-                <a:lnTo>
-                  <a:pt x="65093" y="14528"/>
-                </a:lnTo>
-                <a:close/>
-                <a:moveTo>
-                  <a:pt x="65093" y="16321"/>
-                </a:moveTo>
-                <a:lnTo>
-                  <a:pt x="65565" y="16698"/>
-                </a:lnTo>
-                <a:lnTo>
-                  <a:pt x="65942" y="17076"/>
-                </a:lnTo>
-                <a:lnTo>
-                  <a:pt x="66320" y="17547"/>
-                </a:lnTo>
-                <a:lnTo>
-                  <a:pt x="66414" y="17830"/>
-                </a:lnTo>
-                <a:lnTo>
-                  <a:pt x="66508" y="18113"/>
-                </a:lnTo>
-                <a:lnTo>
-                  <a:pt x="65848" y="17170"/>
-                </a:lnTo>
-                <a:lnTo>
-                  <a:pt x="65093" y="16321"/>
-                </a:lnTo>
-                <a:close/>
-                <a:moveTo>
-                  <a:pt x="72074" y="36226"/>
-                </a:moveTo>
-                <a:lnTo>
-                  <a:pt x="71791" y="37547"/>
-                </a:lnTo>
-                <a:lnTo>
-                  <a:pt x="71603" y="38773"/>
-                </a:lnTo>
-                <a:lnTo>
-                  <a:pt x="71320" y="40000"/>
-                </a:lnTo>
-                <a:lnTo>
-                  <a:pt x="70754" y="41509"/>
-                </a:lnTo>
-                <a:lnTo>
-                  <a:pt x="70942" y="40283"/>
-                </a:lnTo>
-                <a:lnTo>
-                  <a:pt x="71225" y="38962"/>
-                </a:lnTo>
-                <a:lnTo>
-                  <a:pt x="72074" y="36226"/>
-                </a:lnTo>
-                <a:close/>
-                <a:moveTo>
-                  <a:pt x="69150" y="44433"/>
-                </a:moveTo>
-                <a:lnTo>
-                  <a:pt x="68867" y="44905"/>
-                </a:lnTo>
-                <a:lnTo>
-                  <a:pt x="68584" y="45377"/>
-                </a:lnTo>
-                <a:lnTo>
-                  <a:pt x="68206" y="45754"/>
-                </a:lnTo>
-                <a:lnTo>
-                  <a:pt x="67923" y="46132"/>
-                </a:lnTo>
-                <a:lnTo>
-                  <a:pt x="68112" y="45754"/>
-                </a:lnTo>
-                <a:lnTo>
-                  <a:pt x="68678" y="45188"/>
-                </a:lnTo>
-                <a:lnTo>
-                  <a:pt x="69150" y="44433"/>
-                </a:lnTo>
-                <a:close/>
-                <a:moveTo>
-                  <a:pt x="67357" y="47830"/>
-                </a:moveTo>
-                <a:lnTo>
-                  <a:pt x="66886" y="48584"/>
-                </a:lnTo>
-                <a:lnTo>
-                  <a:pt x="66508" y="48867"/>
-                </a:lnTo>
-                <a:lnTo>
-                  <a:pt x="66414" y="48867"/>
-                </a:lnTo>
-                <a:lnTo>
-                  <a:pt x="66414" y="48773"/>
-                </a:lnTo>
-                <a:lnTo>
-                  <a:pt x="66886" y="48301"/>
-                </a:lnTo>
-                <a:lnTo>
-                  <a:pt x="67357" y="47830"/>
-                </a:lnTo>
-                <a:close/>
-                <a:moveTo>
-                  <a:pt x="65093" y="48396"/>
-                </a:moveTo>
-                <a:lnTo>
-                  <a:pt x="65376" y="48490"/>
-                </a:lnTo>
-                <a:lnTo>
-                  <a:pt x="64905" y="49056"/>
-                </a:lnTo>
-                <a:lnTo>
-                  <a:pt x="64622" y="49528"/>
-                </a:lnTo>
-                <a:lnTo>
-                  <a:pt x="64244" y="49811"/>
-                </a:lnTo>
-                <a:lnTo>
-                  <a:pt x="64244" y="49905"/>
-                </a:lnTo>
-                <a:lnTo>
-                  <a:pt x="64056" y="49905"/>
-                </a:lnTo>
-                <a:lnTo>
-                  <a:pt x="64056" y="49811"/>
-                </a:lnTo>
-                <a:lnTo>
-                  <a:pt x="64433" y="49150"/>
-                </a:lnTo>
-                <a:lnTo>
-                  <a:pt x="64622" y="48867"/>
-                </a:lnTo>
-                <a:lnTo>
-                  <a:pt x="64905" y="48584"/>
-                </a:lnTo>
-                <a:lnTo>
-                  <a:pt x="65093" y="48396"/>
-                </a:lnTo>
-                <a:close/>
-                <a:moveTo>
-                  <a:pt x="6981" y="52452"/>
-                </a:moveTo>
-                <a:lnTo>
-                  <a:pt x="7170" y="53112"/>
-                </a:lnTo>
-                <a:lnTo>
-                  <a:pt x="7075" y="53018"/>
-                </a:lnTo>
-                <a:lnTo>
-                  <a:pt x="6981" y="52641"/>
-                </a:lnTo>
-                <a:lnTo>
-                  <a:pt x="6981" y="52452"/>
-                </a:lnTo>
-                <a:close/>
-                <a:moveTo>
-                  <a:pt x="7736" y="54339"/>
-                </a:moveTo>
-                <a:lnTo>
-                  <a:pt x="7641" y="54433"/>
-                </a:lnTo>
-                <a:lnTo>
-                  <a:pt x="7641" y="54339"/>
-                </a:lnTo>
-                <a:close/>
-                <a:moveTo>
-                  <a:pt x="61225" y="55094"/>
-                </a:moveTo>
-                <a:lnTo>
-                  <a:pt x="61037" y="55377"/>
-                </a:lnTo>
-                <a:lnTo>
-                  <a:pt x="60754" y="55471"/>
-                </a:lnTo>
-                <a:lnTo>
-                  <a:pt x="60754" y="55471"/>
-                </a:lnTo>
-                <a:lnTo>
-                  <a:pt x="60942" y="55282"/>
-                </a:lnTo>
-                <a:lnTo>
-                  <a:pt x="61225" y="55094"/>
-                </a:lnTo>
-                <a:close/>
-                <a:moveTo>
-                  <a:pt x="6132" y="53867"/>
-                </a:moveTo>
-                <a:lnTo>
-                  <a:pt x="7358" y="55377"/>
-                </a:lnTo>
-                <a:lnTo>
-                  <a:pt x="7641" y="55471"/>
-                </a:lnTo>
-                <a:lnTo>
-                  <a:pt x="7641" y="55471"/>
-                </a:lnTo>
-                <a:lnTo>
-                  <a:pt x="7641" y="55471"/>
-                </a:lnTo>
-                <a:lnTo>
-                  <a:pt x="7830" y="55565"/>
-                </a:lnTo>
-                <a:lnTo>
-                  <a:pt x="8302" y="56414"/>
-                </a:lnTo>
-                <a:lnTo>
-                  <a:pt x="7170" y="55471"/>
-                </a:lnTo>
-                <a:lnTo>
-                  <a:pt x="6509" y="54622"/>
-                </a:lnTo>
-                <a:lnTo>
-                  <a:pt x="6226" y="54245"/>
-                </a:lnTo>
-                <a:lnTo>
-                  <a:pt x="6132" y="53867"/>
-                </a:lnTo>
-                <a:close/>
-                <a:moveTo>
-                  <a:pt x="9056" y="56414"/>
-                </a:moveTo>
-                <a:lnTo>
-                  <a:pt x="9245" y="56509"/>
-                </a:lnTo>
-                <a:lnTo>
-                  <a:pt x="9151" y="56509"/>
-                </a:lnTo>
-                <a:lnTo>
-                  <a:pt x="9056" y="56414"/>
-                </a:lnTo>
-                <a:close/>
-                <a:moveTo>
-                  <a:pt x="10472" y="56980"/>
-                </a:moveTo>
-                <a:lnTo>
-                  <a:pt x="11321" y="57358"/>
-                </a:lnTo>
-                <a:lnTo>
-                  <a:pt x="11887" y="57735"/>
-                </a:lnTo>
-                <a:lnTo>
-                  <a:pt x="12264" y="58018"/>
-                </a:lnTo>
-                <a:lnTo>
-                  <a:pt x="11604" y="57641"/>
-                </a:lnTo>
-                <a:lnTo>
-                  <a:pt x="11604" y="57641"/>
-                </a:lnTo>
-                <a:lnTo>
-                  <a:pt x="11792" y="58112"/>
-                </a:lnTo>
-                <a:lnTo>
-                  <a:pt x="11604" y="58018"/>
-                </a:lnTo>
-                <a:lnTo>
-                  <a:pt x="11132" y="57452"/>
-                </a:lnTo>
-                <a:lnTo>
-                  <a:pt x="10849" y="57169"/>
-                </a:lnTo>
-                <a:lnTo>
-                  <a:pt x="10472" y="56980"/>
-                </a:lnTo>
-                <a:close/>
-                <a:moveTo>
-                  <a:pt x="18019" y="59433"/>
-                </a:moveTo>
-                <a:lnTo>
-                  <a:pt x="18773" y="59810"/>
-                </a:lnTo>
-                <a:lnTo>
-                  <a:pt x="19528" y="60376"/>
-                </a:lnTo>
-                <a:lnTo>
-                  <a:pt x="19056" y="60282"/>
-                </a:lnTo>
-                <a:lnTo>
-                  <a:pt x="18962" y="60188"/>
-                </a:lnTo>
-                <a:lnTo>
-                  <a:pt x="18490" y="59810"/>
-                </a:lnTo>
-                <a:lnTo>
-                  <a:pt x="18019" y="59433"/>
-                </a:lnTo>
-                <a:close/>
-                <a:moveTo>
-                  <a:pt x="14528" y="59999"/>
-                </a:moveTo>
-                <a:lnTo>
-                  <a:pt x="14717" y="60093"/>
-                </a:lnTo>
-                <a:lnTo>
-                  <a:pt x="14905" y="60188"/>
-                </a:lnTo>
-                <a:lnTo>
-                  <a:pt x="15188" y="60471"/>
-                </a:lnTo>
-                <a:lnTo>
-                  <a:pt x="15283" y="60565"/>
-                </a:lnTo>
-                <a:lnTo>
-                  <a:pt x="15188" y="60565"/>
-                </a:lnTo>
-                <a:lnTo>
-                  <a:pt x="14528" y="59999"/>
-                </a:lnTo>
-                <a:close/>
-                <a:moveTo>
-                  <a:pt x="49339" y="60188"/>
-                </a:moveTo>
-                <a:lnTo>
-                  <a:pt x="48395" y="60565"/>
-                </a:lnTo>
-                <a:lnTo>
-                  <a:pt x="47924" y="60754"/>
-                </a:lnTo>
-                <a:lnTo>
-                  <a:pt x="47452" y="60754"/>
-                </a:lnTo>
-                <a:lnTo>
-                  <a:pt x="47924" y="60471"/>
-                </a:lnTo>
-                <a:lnTo>
-                  <a:pt x="48301" y="60282"/>
-                </a:lnTo>
-                <a:lnTo>
-                  <a:pt x="49056" y="60188"/>
-                </a:lnTo>
-                <a:close/>
-                <a:moveTo>
-                  <a:pt x="19245" y="60565"/>
-                </a:moveTo>
-                <a:lnTo>
-                  <a:pt x="19811" y="60659"/>
-                </a:lnTo>
-                <a:lnTo>
-                  <a:pt x="20566" y="61037"/>
-                </a:lnTo>
-                <a:lnTo>
-                  <a:pt x="20566" y="61037"/>
-                </a:lnTo>
-                <a:lnTo>
-                  <a:pt x="19811" y="60848"/>
-                </a:lnTo>
-                <a:lnTo>
-                  <a:pt x="19245" y="60565"/>
-                </a:lnTo>
-                <a:close/>
-                <a:moveTo>
-                  <a:pt x="47075" y="61226"/>
-                </a:moveTo>
-                <a:lnTo>
-                  <a:pt x="46792" y="61414"/>
-                </a:lnTo>
-                <a:lnTo>
-                  <a:pt x="46697" y="61509"/>
-                </a:lnTo>
-                <a:lnTo>
-                  <a:pt x="46792" y="61603"/>
-                </a:lnTo>
-                <a:lnTo>
-                  <a:pt x="47263" y="61603"/>
-                </a:lnTo>
-                <a:lnTo>
-                  <a:pt x="47641" y="61509"/>
-                </a:lnTo>
-                <a:lnTo>
-                  <a:pt x="46886" y="61792"/>
-                </a:lnTo>
-                <a:lnTo>
-                  <a:pt x="46131" y="61886"/>
-                </a:lnTo>
-                <a:lnTo>
-                  <a:pt x="46131" y="61980"/>
-                </a:lnTo>
-                <a:lnTo>
-                  <a:pt x="46037" y="61980"/>
-                </a:lnTo>
-                <a:lnTo>
-                  <a:pt x="45660" y="61697"/>
-                </a:lnTo>
-                <a:lnTo>
-                  <a:pt x="46320" y="61320"/>
-                </a:lnTo>
-                <a:lnTo>
-                  <a:pt x="47075" y="61226"/>
-                </a:lnTo>
-                <a:close/>
-                <a:moveTo>
-                  <a:pt x="24151" y="63678"/>
-                </a:moveTo>
-                <a:lnTo>
-                  <a:pt x="24905" y="63961"/>
-                </a:lnTo>
-                <a:lnTo>
-                  <a:pt x="25754" y="64244"/>
-                </a:lnTo>
-                <a:lnTo>
-                  <a:pt x="25188" y="64244"/>
-                </a:lnTo>
-                <a:lnTo>
-                  <a:pt x="24151" y="64150"/>
-                </a:lnTo>
-                <a:lnTo>
-                  <a:pt x="23773" y="64056"/>
-                </a:lnTo>
-                <a:lnTo>
-                  <a:pt x="23585" y="63961"/>
-                </a:lnTo>
-                <a:lnTo>
-                  <a:pt x="23585" y="63867"/>
-                </a:lnTo>
-                <a:lnTo>
-                  <a:pt x="23585" y="63773"/>
-                </a:lnTo>
-                <a:lnTo>
-                  <a:pt x="24151" y="63678"/>
-                </a:lnTo>
-                <a:close/>
-                <a:moveTo>
-                  <a:pt x="34811" y="64622"/>
-                </a:moveTo>
-                <a:lnTo>
-                  <a:pt x="35094" y="64810"/>
-                </a:lnTo>
-                <a:lnTo>
-                  <a:pt x="35377" y="64905"/>
-                </a:lnTo>
-                <a:lnTo>
-                  <a:pt x="34622" y="64999"/>
-                </a:lnTo>
-                <a:lnTo>
-                  <a:pt x="34056" y="64999"/>
-                </a:lnTo>
-                <a:lnTo>
-                  <a:pt x="34056" y="64905"/>
-                </a:lnTo>
-                <a:lnTo>
-                  <a:pt x="34811" y="64622"/>
-                </a:lnTo>
-                <a:close/>
-                <a:moveTo>
-                  <a:pt x="46414" y="63773"/>
-                </a:moveTo>
-                <a:lnTo>
-                  <a:pt x="46131" y="64056"/>
-                </a:lnTo>
-                <a:lnTo>
-                  <a:pt x="44433" y="64716"/>
-                </a:lnTo>
-                <a:lnTo>
-                  <a:pt x="43962" y="64905"/>
-                </a:lnTo>
-                <a:lnTo>
-                  <a:pt x="44150" y="64810"/>
-                </a:lnTo>
-                <a:lnTo>
-                  <a:pt x="42641" y="64999"/>
-                </a:lnTo>
-                <a:lnTo>
-                  <a:pt x="42924" y="64810"/>
-                </a:lnTo>
-                <a:lnTo>
-                  <a:pt x="43207" y="64622"/>
-                </a:lnTo>
-                <a:lnTo>
-                  <a:pt x="42358" y="64905"/>
-                </a:lnTo>
-                <a:lnTo>
-                  <a:pt x="43113" y="64622"/>
-                </a:lnTo>
-                <a:lnTo>
-                  <a:pt x="45377" y="63867"/>
-                </a:lnTo>
-                <a:lnTo>
-                  <a:pt x="44999" y="64150"/>
-                </a:lnTo>
-                <a:lnTo>
-                  <a:pt x="44622" y="64433"/>
-                </a:lnTo>
-                <a:lnTo>
-                  <a:pt x="46414" y="63773"/>
-                </a:lnTo>
-                <a:close/>
-                <a:moveTo>
-                  <a:pt x="39905" y="64622"/>
-                </a:moveTo>
-                <a:lnTo>
-                  <a:pt x="39811" y="64716"/>
-                </a:lnTo>
-                <a:lnTo>
-                  <a:pt x="39622" y="64810"/>
-                </a:lnTo>
-                <a:lnTo>
-                  <a:pt x="38962" y="64999"/>
-                </a:lnTo>
-                <a:lnTo>
-                  <a:pt x="38207" y="65093"/>
-                </a:lnTo>
-                <a:lnTo>
-                  <a:pt x="37641" y="65093"/>
-                </a:lnTo>
-                <a:lnTo>
-                  <a:pt x="39056" y="64810"/>
-                </a:lnTo>
-                <a:lnTo>
-                  <a:pt x="39528" y="64716"/>
-                </a:lnTo>
-                <a:lnTo>
-                  <a:pt x="39905" y="64622"/>
-                </a:lnTo>
-                <a:close/>
-                <a:moveTo>
-                  <a:pt x="42829" y="64056"/>
-                </a:moveTo>
-                <a:lnTo>
-                  <a:pt x="42452" y="64244"/>
-                </a:lnTo>
-                <a:lnTo>
-                  <a:pt x="42263" y="64433"/>
-                </a:lnTo>
-                <a:lnTo>
-                  <a:pt x="41980" y="64622"/>
-                </a:lnTo>
-                <a:lnTo>
-                  <a:pt x="41886" y="64999"/>
-                </a:lnTo>
-                <a:lnTo>
-                  <a:pt x="42263" y="64999"/>
-                </a:lnTo>
-                <a:lnTo>
-                  <a:pt x="40094" y="65282"/>
-                </a:lnTo>
-                <a:lnTo>
-                  <a:pt x="40848" y="64999"/>
-                </a:lnTo>
-                <a:lnTo>
-                  <a:pt x="41131" y="64810"/>
-                </a:lnTo>
-                <a:lnTo>
-                  <a:pt x="41131" y="64716"/>
-                </a:lnTo>
-                <a:lnTo>
-                  <a:pt x="41037" y="64622"/>
-                </a:lnTo>
-                <a:lnTo>
-                  <a:pt x="40754" y="64622"/>
-                </a:lnTo>
-                <a:lnTo>
-                  <a:pt x="40282" y="64527"/>
-                </a:lnTo>
-                <a:lnTo>
-                  <a:pt x="40188" y="64433"/>
-                </a:lnTo>
-                <a:lnTo>
-                  <a:pt x="41509" y="64339"/>
-                </a:lnTo>
-                <a:lnTo>
-                  <a:pt x="42829" y="64056"/>
-                </a:lnTo>
-                <a:close/>
-                <a:moveTo>
-                  <a:pt x="15660" y="60376"/>
-                </a:moveTo>
-                <a:lnTo>
-                  <a:pt x="16887" y="61131"/>
-                </a:lnTo>
-                <a:lnTo>
-                  <a:pt x="17924" y="62075"/>
-                </a:lnTo>
-                <a:lnTo>
-                  <a:pt x="17924" y="61792"/>
-                </a:lnTo>
-                <a:lnTo>
-                  <a:pt x="17830" y="61603"/>
-                </a:lnTo>
-                <a:lnTo>
-                  <a:pt x="19056" y="61980"/>
-                </a:lnTo>
-                <a:lnTo>
-                  <a:pt x="20283" y="62358"/>
-                </a:lnTo>
-                <a:lnTo>
-                  <a:pt x="20849" y="62546"/>
-                </a:lnTo>
-                <a:lnTo>
-                  <a:pt x="21415" y="62735"/>
-                </a:lnTo>
-                <a:lnTo>
-                  <a:pt x="21886" y="63018"/>
-                </a:lnTo>
-                <a:lnTo>
-                  <a:pt x="22358" y="63395"/>
-                </a:lnTo>
-                <a:lnTo>
-                  <a:pt x="21509" y="63301"/>
-                </a:lnTo>
-                <a:lnTo>
-                  <a:pt x="22547" y="63867"/>
-                </a:lnTo>
-                <a:lnTo>
-                  <a:pt x="23868" y="64339"/>
-                </a:lnTo>
-                <a:lnTo>
-                  <a:pt x="25471" y="64905"/>
-                </a:lnTo>
-                <a:lnTo>
-                  <a:pt x="27169" y="65282"/>
-                </a:lnTo>
-                <a:lnTo>
-                  <a:pt x="26603" y="65282"/>
-                </a:lnTo>
-                <a:lnTo>
-                  <a:pt x="27075" y="65942"/>
-                </a:lnTo>
-                <a:lnTo>
-                  <a:pt x="26886" y="65942"/>
-                </a:lnTo>
-                <a:lnTo>
-                  <a:pt x="26603" y="65848"/>
-                </a:lnTo>
-                <a:lnTo>
-                  <a:pt x="25849" y="65659"/>
-                </a:lnTo>
-                <a:lnTo>
-                  <a:pt x="25283" y="65471"/>
-                </a:lnTo>
-                <a:lnTo>
-                  <a:pt x="25188" y="65376"/>
-                </a:lnTo>
-                <a:lnTo>
-                  <a:pt x="25754" y="65376"/>
-                </a:lnTo>
-                <a:lnTo>
-                  <a:pt x="26226" y="65471"/>
-                </a:lnTo>
-                <a:lnTo>
-                  <a:pt x="26320" y="65282"/>
-                </a:lnTo>
-                <a:lnTo>
-                  <a:pt x="26320" y="65188"/>
-                </a:lnTo>
-                <a:lnTo>
-                  <a:pt x="26226" y="65093"/>
-                </a:lnTo>
-                <a:lnTo>
-                  <a:pt x="25660" y="65093"/>
-                </a:lnTo>
-                <a:lnTo>
-                  <a:pt x="25188" y="65188"/>
-                </a:lnTo>
-                <a:lnTo>
-                  <a:pt x="24528" y="65376"/>
-                </a:lnTo>
-                <a:lnTo>
-                  <a:pt x="24528" y="65376"/>
-                </a:lnTo>
-                <a:lnTo>
-                  <a:pt x="25000" y="65093"/>
-                </a:lnTo>
-                <a:lnTo>
-                  <a:pt x="23679" y="64905"/>
-                </a:lnTo>
-                <a:lnTo>
-                  <a:pt x="22547" y="64716"/>
-                </a:lnTo>
-                <a:lnTo>
-                  <a:pt x="21603" y="64339"/>
-                </a:lnTo>
-                <a:lnTo>
-                  <a:pt x="20660" y="63867"/>
-                </a:lnTo>
-                <a:lnTo>
-                  <a:pt x="20943" y="63867"/>
-                </a:lnTo>
-                <a:lnTo>
-                  <a:pt x="20377" y="63773"/>
-                </a:lnTo>
-                <a:lnTo>
-                  <a:pt x="19339" y="63678"/>
-                </a:lnTo>
-                <a:lnTo>
-                  <a:pt x="18868" y="63490"/>
-                </a:lnTo>
-                <a:lnTo>
-                  <a:pt x="18396" y="63301"/>
-                </a:lnTo>
-                <a:lnTo>
-                  <a:pt x="18585" y="63207"/>
-                </a:lnTo>
-                <a:lnTo>
-                  <a:pt x="18868" y="63301"/>
-                </a:lnTo>
-                <a:lnTo>
-                  <a:pt x="18019" y="62735"/>
-                </a:lnTo>
-                <a:lnTo>
-                  <a:pt x="16981" y="62075"/>
-                </a:lnTo>
-                <a:lnTo>
-                  <a:pt x="14811" y="60471"/>
-                </a:lnTo>
-                <a:lnTo>
-                  <a:pt x="16415" y="61414"/>
-                </a:lnTo>
-                <a:lnTo>
-                  <a:pt x="15660" y="60376"/>
-                </a:lnTo>
-                <a:close/>
-                <a:moveTo>
-                  <a:pt x="28867" y="65659"/>
-                </a:moveTo>
-                <a:lnTo>
-                  <a:pt x="30660" y="65942"/>
-                </a:lnTo>
-                <a:lnTo>
-                  <a:pt x="32547" y="66131"/>
-                </a:lnTo>
-                <a:lnTo>
-                  <a:pt x="32075" y="66225"/>
-                </a:lnTo>
-                <a:lnTo>
-                  <a:pt x="31320" y="66225"/>
-                </a:lnTo>
-                <a:lnTo>
-                  <a:pt x="30566" y="66131"/>
-                </a:lnTo>
-                <a:lnTo>
-                  <a:pt x="28867" y="65659"/>
-                </a:lnTo>
-                <a:close/>
-                <a:moveTo>
-                  <a:pt x="39150" y="0"/>
-                </a:moveTo>
-                <a:lnTo>
-                  <a:pt x="39528" y="283"/>
-                </a:lnTo>
-                <a:lnTo>
-                  <a:pt x="39622" y="378"/>
-                </a:lnTo>
-                <a:lnTo>
-                  <a:pt x="41509" y="1038"/>
-                </a:lnTo>
-                <a:lnTo>
-                  <a:pt x="40943" y="1132"/>
-                </a:lnTo>
-                <a:lnTo>
-                  <a:pt x="40282" y="1227"/>
-                </a:lnTo>
-                <a:lnTo>
-                  <a:pt x="38962" y="1038"/>
-                </a:lnTo>
-                <a:lnTo>
-                  <a:pt x="37547" y="849"/>
-                </a:lnTo>
-                <a:lnTo>
-                  <a:pt x="36320" y="661"/>
-                </a:lnTo>
-                <a:lnTo>
-                  <a:pt x="36415" y="755"/>
-                </a:lnTo>
-                <a:lnTo>
-                  <a:pt x="36415" y="849"/>
-                </a:lnTo>
-                <a:lnTo>
-                  <a:pt x="35943" y="944"/>
-                </a:lnTo>
-                <a:lnTo>
-                  <a:pt x="34150" y="1132"/>
-                </a:lnTo>
-                <a:lnTo>
-                  <a:pt x="31698" y="1132"/>
-                </a:lnTo>
-                <a:lnTo>
-                  <a:pt x="30660" y="1227"/>
-                </a:lnTo>
-                <a:lnTo>
-                  <a:pt x="29716" y="1321"/>
-                </a:lnTo>
-                <a:lnTo>
-                  <a:pt x="30377" y="1416"/>
-                </a:lnTo>
-                <a:lnTo>
-                  <a:pt x="31037" y="1510"/>
-                </a:lnTo>
-                <a:lnTo>
-                  <a:pt x="30094" y="1699"/>
-                </a:lnTo>
-                <a:lnTo>
-                  <a:pt x="28773" y="2076"/>
-                </a:lnTo>
-                <a:lnTo>
-                  <a:pt x="27924" y="2359"/>
-                </a:lnTo>
-                <a:lnTo>
-                  <a:pt x="27924" y="2453"/>
-                </a:lnTo>
-                <a:lnTo>
-                  <a:pt x="28207" y="2453"/>
-                </a:lnTo>
-                <a:lnTo>
-                  <a:pt x="26509" y="3019"/>
-                </a:lnTo>
-                <a:lnTo>
-                  <a:pt x="26792" y="2831"/>
-                </a:lnTo>
-                <a:lnTo>
-                  <a:pt x="26792" y="2831"/>
-                </a:lnTo>
-                <a:lnTo>
-                  <a:pt x="25660" y="2925"/>
-                </a:lnTo>
-                <a:lnTo>
-                  <a:pt x="25754" y="2831"/>
-                </a:lnTo>
-                <a:lnTo>
-                  <a:pt x="25377" y="2925"/>
-                </a:lnTo>
-                <a:lnTo>
-                  <a:pt x="24905" y="3208"/>
-                </a:lnTo>
-                <a:lnTo>
-                  <a:pt x="24056" y="3774"/>
-                </a:lnTo>
-                <a:lnTo>
-                  <a:pt x="22264" y="4340"/>
-                </a:lnTo>
-                <a:lnTo>
-                  <a:pt x="20471" y="5095"/>
-                </a:lnTo>
-                <a:lnTo>
-                  <a:pt x="18679" y="5755"/>
-                </a:lnTo>
-                <a:lnTo>
-                  <a:pt x="16981" y="6604"/>
-                </a:lnTo>
-                <a:lnTo>
-                  <a:pt x="17453" y="6604"/>
-                </a:lnTo>
-                <a:lnTo>
-                  <a:pt x="17830" y="6415"/>
-                </a:lnTo>
-                <a:lnTo>
-                  <a:pt x="18868" y="6038"/>
-                </a:lnTo>
-                <a:lnTo>
-                  <a:pt x="19905" y="5661"/>
-                </a:lnTo>
-                <a:lnTo>
-                  <a:pt x="20377" y="5472"/>
-                </a:lnTo>
-                <a:lnTo>
-                  <a:pt x="20943" y="5378"/>
-                </a:lnTo>
-                <a:lnTo>
-                  <a:pt x="20943" y="5378"/>
-                </a:lnTo>
-                <a:lnTo>
-                  <a:pt x="19528" y="6038"/>
-                </a:lnTo>
-                <a:lnTo>
-                  <a:pt x="19528" y="6038"/>
-                </a:lnTo>
-                <a:lnTo>
-                  <a:pt x="20094" y="5944"/>
-                </a:lnTo>
-                <a:lnTo>
-                  <a:pt x="18396" y="7076"/>
-                </a:lnTo>
-                <a:lnTo>
-                  <a:pt x="20849" y="6038"/>
-                </a:lnTo>
-                <a:lnTo>
-                  <a:pt x="23396" y="5095"/>
-                </a:lnTo>
-                <a:lnTo>
-                  <a:pt x="26037" y="4246"/>
-                </a:lnTo>
-                <a:lnTo>
-                  <a:pt x="28679" y="3397"/>
-                </a:lnTo>
-                <a:lnTo>
-                  <a:pt x="28301" y="3491"/>
-                </a:lnTo>
-                <a:lnTo>
-                  <a:pt x="28773" y="3208"/>
-                </a:lnTo>
-                <a:lnTo>
-                  <a:pt x="30283" y="2736"/>
-                </a:lnTo>
-                <a:lnTo>
-                  <a:pt x="29905" y="2831"/>
-                </a:lnTo>
-                <a:lnTo>
-                  <a:pt x="29056" y="2831"/>
-                </a:lnTo>
-                <a:lnTo>
-                  <a:pt x="28584" y="2642"/>
-                </a:lnTo>
-                <a:lnTo>
-                  <a:pt x="30566" y="2548"/>
-                </a:lnTo>
-                <a:lnTo>
-                  <a:pt x="32641" y="2548"/>
-                </a:lnTo>
-                <a:lnTo>
-                  <a:pt x="37264" y="2831"/>
-                </a:lnTo>
-                <a:lnTo>
-                  <a:pt x="39528" y="3019"/>
-                </a:lnTo>
-                <a:lnTo>
-                  <a:pt x="43490" y="3019"/>
-                </a:lnTo>
-                <a:lnTo>
-                  <a:pt x="44339" y="2831"/>
-                </a:lnTo>
-                <a:lnTo>
-                  <a:pt x="45094" y="2736"/>
-                </a:lnTo>
-                <a:lnTo>
-                  <a:pt x="45943" y="3114"/>
-                </a:lnTo>
-                <a:lnTo>
-                  <a:pt x="46886" y="3397"/>
-                </a:lnTo>
-                <a:lnTo>
-                  <a:pt x="48678" y="3963"/>
-                </a:lnTo>
-                <a:lnTo>
-                  <a:pt x="50565" y="4434"/>
-                </a:lnTo>
-                <a:lnTo>
-                  <a:pt x="51509" y="4717"/>
-                </a:lnTo>
-                <a:lnTo>
-                  <a:pt x="52358" y="5189"/>
-                </a:lnTo>
-                <a:lnTo>
-                  <a:pt x="51792" y="4812"/>
-                </a:lnTo>
-                <a:lnTo>
-                  <a:pt x="53584" y="5849"/>
-                </a:lnTo>
-                <a:lnTo>
-                  <a:pt x="55376" y="6981"/>
-                </a:lnTo>
-                <a:lnTo>
-                  <a:pt x="56320" y="7642"/>
-                </a:lnTo>
-                <a:lnTo>
-                  <a:pt x="57169" y="8302"/>
-                </a:lnTo>
-                <a:lnTo>
-                  <a:pt x="57924" y="9057"/>
-                </a:lnTo>
-                <a:lnTo>
-                  <a:pt x="58678" y="9906"/>
-                </a:lnTo>
-                <a:lnTo>
-                  <a:pt x="62357" y="14057"/>
-                </a:lnTo>
-                <a:lnTo>
-                  <a:pt x="64622" y="16887"/>
-                </a:lnTo>
-                <a:lnTo>
-                  <a:pt x="66697" y="19623"/>
-                </a:lnTo>
-                <a:lnTo>
-                  <a:pt x="66603" y="19151"/>
-                </a:lnTo>
-                <a:lnTo>
-                  <a:pt x="66603" y="18774"/>
-                </a:lnTo>
-                <a:lnTo>
-                  <a:pt x="67357" y="20472"/>
-                </a:lnTo>
-                <a:lnTo>
-                  <a:pt x="68772" y="23962"/>
-                </a:lnTo>
-                <a:lnTo>
-                  <a:pt x="68867" y="24151"/>
-                </a:lnTo>
-                <a:lnTo>
-                  <a:pt x="69810" y="26792"/>
-                </a:lnTo>
-                <a:lnTo>
-                  <a:pt x="70565" y="29245"/>
-                </a:lnTo>
-                <a:lnTo>
-                  <a:pt x="70754" y="30283"/>
-                </a:lnTo>
-                <a:lnTo>
-                  <a:pt x="70848" y="31037"/>
-                </a:lnTo>
-                <a:lnTo>
-                  <a:pt x="70848" y="31604"/>
-                </a:lnTo>
-                <a:lnTo>
-                  <a:pt x="70754" y="31792"/>
-                </a:lnTo>
-                <a:lnTo>
-                  <a:pt x="70565" y="31887"/>
-                </a:lnTo>
-                <a:lnTo>
-                  <a:pt x="69433" y="36698"/>
-                </a:lnTo>
-                <a:lnTo>
-                  <a:pt x="68206" y="41698"/>
-                </a:lnTo>
-                <a:lnTo>
-                  <a:pt x="68584" y="41037"/>
-                </a:lnTo>
-                <a:lnTo>
-                  <a:pt x="68961" y="40188"/>
-                </a:lnTo>
-                <a:lnTo>
-                  <a:pt x="69244" y="40471"/>
-                </a:lnTo>
-                <a:lnTo>
-                  <a:pt x="69244" y="40849"/>
-                </a:lnTo>
-                <a:lnTo>
-                  <a:pt x="69244" y="41226"/>
-                </a:lnTo>
-                <a:lnTo>
-                  <a:pt x="69055" y="41698"/>
-                </a:lnTo>
-                <a:lnTo>
-                  <a:pt x="68489" y="42924"/>
-                </a:lnTo>
-                <a:lnTo>
-                  <a:pt x="67735" y="44150"/>
-                </a:lnTo>
-                <a:lnTo>
-                  <a:pt x="66791" y="45377"/>
-                </a:lnTo>
-                <a:lnTo>
-                  <a:pt x="65942" y="46509"/>
-                </a:lnTo>
-                <a:lnTo>
-                  <a:pt x="64716" y="47924"/>
-                </a:lnTo>
-                <a:lnTo>
-                  <a:pt x="65565" y="47641"/>
-                </a:lnTo>
-                <a:lnTo>
-                  <a:pt x="65093" y="48301"/>
-                </a:lnTo>
-                <a:lnTo>
-                  <a:pt x="64433" y="48962"/>
-                </a:lnTo>
-                <a:lnTo>
-                  <a:pt x="63112" y="50188"/>
-                </a:lnTo>
-                <a:lnTo>
-                  <a:pt x="63678" y="48962"/>
-                </a:lnTo>
-                <a:lnTo>
-                  <a:pt x="64244" y="47641"/>
-                </a:lnTo>
-                <a:lnTo>
-                  <a:pt x="65754" y="44811"/>
-                </a:lnTo>
-                <a:lnTo>
-                  <a:pt x="67169" y="42169"/>
-                </a:lnTo>
-                <a:lnTo>
-                  <a:pt x="67735" y="41037"/>
-                </a:lnTo>
-                <a:lnTo>
-                  <a:pt x="68206" y="40094"/>
-                </a:lnTo>
-                <a:lnTo>
-                  <a:pt x="68206" y="39811"/>
-                </a:lnTo>
-                <a:lnTo>
-                  <a:pt x="68301" y="39622"/>
-                </a:lnTo>
-                <a:lnTo>
-                  <a:pt x="68301" y="39717"/>
-                </a:lnTo>
-                <a:lnTo>
-                  <a:pt x="68395" y="39339"/>
-                </a:lnTo>
-                <a:lnTo>
-                  <a:pt x="68772" y="37735"/>
-                </a:lnTo>
-                <a:lnTo>
-                  <a:pt x="69055" y="36037"/>
-                </a:lnTo>
-                <a:lnTo>
-                  <a:pt x="69150" y="32924"/>
-                </a:lnTo>
-                <a:lnTo>
-                  <a:pt x="69150" y="30849"/>
-                </a:lnTo>
-                <a:lnTo>
-                  <a:pt x="69150" y="28679"/>
-                </a:lnTo>
-                <a:lnTo>
-                  <a:pt x="68961" y="28773"/>
-                </a:lnTo>
-                <a:lnTo>
-                  <a:pt x="68961" y="29056"/>
-                </a:lnTo>
-                <a:lnTo>
-                  <a:pt x="68678" y="28302"/>
-                </a:lnTo>
-                <a:lnTo>
-                  <a:pt x="68395" y="27453"/>
-                </a:lnTo>
-                <a:lnTo>
-                  <a:pt x="68018" y="25755"/>
-                </a:lnTo>
-                <a:lnTo>
-                  <a:pt x="67923" y="25283"/>
-                </a:lnTo>
-                <a:lnTo>
-                  <a:pt x="67923" y="25472"/>
-                </a:lnTo>
-                <a:lnTo>
-                  <a:pt x="67546" y="24906"/>
-                </a:lnTo>
-                <a:lnTo>
-                  <a:pt x="67074" y="24245"/>
-                </a:lnTo>
-                <a:lnTo>
-                  <a:pt x="66980" y="24057"/>
-                </a:lnTo>
-                <a:lnTo>
-                  <a:pt x="65471" y="22264"/>
-                </a:lnTo>
-                <a:lnTo>
-                  <a:pt x="64810" y="21415"/>
-                </a:lnTo>
-                <a:lnTo>
-                  <a:pt x="64339" y="20755"/>
-                </a:lnTo>
-                <a:lnTo>
-                  <a:pt x="64622" y="20943"/>
-                </a:lnTo>
-                <a:lnTo>
-                  <a:pt x="64527" y="20755"/>
-                </a:lnTo>
-                <a:lnTo>
-                  <a:pt x="64339" y="20472"/>
-                </a:lnTo>
-                <a:lnTo>
-                  <a:pt x="63301" y="19434"/>
-                </a:lnTo>
-                <a:lnTo>
-                  <a:pt x="62357" y="18585"/>
-                </a:lnTo>
-                <a:lnTo>
-                  <a:pt x="62452" y="18679"/>
-                </a:lnTo>
-                <a:lnTo>
-                  <a:pt x="62357" y="18868"/>
-                </a:lnTo>
-                <a:lnTo>
-                  <a:pt x="61508" y="18019"/>
-                </a:lnTo>
-                <a:lnTo>
-                  <a:pt x="61791" y="18396"/>
-                </a:lnTo>
-                <a:lnTo>
-                  <a:pt x="60848" y="17547"/>
-                </a:lnTo>
-                <a:lnTo>
-                  <a:pt x="60471" y="17076"/>
-                </a:lnTo>
-                <a:lnTo>
-                  <a:pt x="60471" y="16981"/>
-                </a:lnTo>
-                <a:lnTo>
-                  <a:pt x="60565" y="17076"/>
-                </a:lnTo>
-                <a:lnTo>
-                  <a:pt x="61225" y="17547"/>
-                </a:lnTo>
-                <a:lnTo>
-                  <a:pt x="58961" y="15566"/>
-                </a:lnTo>
-                <a:lnTo>
-                  <a:pt x="59527" y="16227"/>
-                </a:lnTo>
-                <a:lnTo>
-                  <a:pt x="58584" y="15566"/>
-                </a:lnTo>
-                <a:lnTo>
-                  <a:pt x="57641" y="14906"/>
-                </a:lnTo>
-                <a:lnTo>
-                  <a:pt x="57546" y="15000"/>
-                </a:lnTo>
-                <a:lnTo>
-                  <a:pt x="57452" y="15094"/>
-                </a:lnTo>
-                <a:lnTo>
-                  <a:pt x="58301" y="15660"/>
-                </a:lnTo>
-                <a:lnTo>
-                  <a:pt x="59056" y="16227"/>
-                </a:lnTo>
-                <a:lnTo>
-                  <a:pt x="60471" y="17547"/>
-                </a:lnTo>
-                <a:lnTo>
-                  <a:pt x="61886" y="18774"/>
-                </a:lnTo>
-                <a:lnTo>
-                  <a:pt x="62640" y="19340"/>
-                </a:lnTo>
-                <a:lnTo>
-                  <a:pt x="63395" y="19906"/>
-                </a:lnTo>
-                <a:lnTo>
-                  <a:pt x="62829" y="19528"/>
-                </a:lnTo>
-                <a:lnTo>
-                  <a:pt x="62074" y="19057"/>
-                </a:lnTo>
-                <a:lnTo>
-                  <a:pt x="62074" y="19245"/>
-                </a:lnTo>
-                <a:lnTo>
-                  <a:pt x="62357" y="19717"/>
-                </a:lnTo>
-                <a:lnTo>
-                  <a:pt x="63584" y="21415"/>
-                </a:lnTo>
-                <a:lnTo>
-                  <a:pt x="65093" y="23207"/>
-                </a:lnTo>
-                <a:lnTo>
-                  <a:pt x="65754" y="23962"/>
-                </a:lnTo>
-                <a:lnTo>
-                  <a:pt x="66225" y="24434"/>
-                </a:lnTo>
-                <a:lnTo>
-                  <a:pt x="66414" y="24528"/>
-                </a:lnTo>
-                <a:lnTo>
-                  <a:pt x="66320" y="24057"/>
-                </a:lnTo>
-                <a:lnTo>
-                  <a:pt x="66697" y="24906"/>
-                </a:lnTo>
-                <a:lnTo>
-                  <a:pt x="67074" y="26038"/>
-                </a:lnTo>
-                <a:lnTo>
-                  <a:pt x="66414" y="24811"/>
-                </a:lnTo>
-                <a:lnTo>
-                  <a:pt x="66791" y="25566"/>
-                </a:lnTo>
-                <a:lnTo>
-                  <a:pt x="67169" y="26321"/>
-                </a:lnTo>
-                <a:lnTo>
-                  <a:pt x="67263" y="26415"/>
-                </a:lnTo>
-                <a:lnTo>
-                  <a:pt x="67923" y="28679"/>
-                </a:lnTo>
-                <a:lnTo>
-                  <a:pt x="68206" y="29339"/>
-                </a:lnTo>
-                <a:lnTo>
-                  <a:pt x="68678" y="30471"/>
-                </a:lnTo>
-                <a:lnTo>
-                  <a:pt x="68772" y="30660"/>
-                </a:lnTo>
-                <a:lnTo>
-                  <a:pt x="68678" y="30660"/>
-                </a:lnTo>
-                <a:lnTo>
-                  <a:pt x="68395" y="30377"/>
-                </a:lnTo>
-                <a:lnTo>
-                  <a:pt x="68206" y="30094"/>
-                </a:lnTo>
-                <a:lnTo>
-                  <a:pt x="68206" y="30566"/>
-                </a:lnTo>
-                <a:lnTo>
-                  <a:pt x="68301" y="31037"/>
-                </a:lnTo>
-                <a:lnTo>
-                  <a:pt x="68395" y="31509"/>
-                </a:lnTo>
-                <a:lnTo>
-                  <a:pt x="68395" y="31887"/>
-                </a:lnTo>
-                <a:lnTo>
-                  <a:pt x="68301" y="31792"/>
-                </a:lnTo>
-                <a:lnTo>
-                  <a:pt x="68301" y="31698"/>
-                </a:lnTo>
-                <a:lnTo>
-                  <a:pt x="68301" y="31415"/>
-                </a:lnTo>
-                <a:lnTo>
-                  <a:pt x="68018" y="30094"/>
-                </a:lnTo>
-                <a:lnTo>
-                  <a:pt x="67735" y="28868"/>
-                </a:lnTo>
-                <a:lnTo>
-                  <a:pt x="68112" y="31698"/>
-                </a:lnTo>
-                <a:lnTo>
-                  <a:pt x="68206" y="33113"/>
-                </a:lnTo>
-                <a:lnTo>
-                  <a:pt x="68206" y="34528"/>
-                </a:lnTo>
-                <a:lnTo>
-                  <a:pt x="68112" y="35943"/>
-                </a:lnTo>
-                <a:lnTo>
-                  <a:pt x="67923" y="37358"/>
-                </a:lnTo>
-                <a:lnTo>
-                  <a:pt x="67546" y="38679"/>
-                </a:lnTo>
-                <a:lnTo>
-                  <a:pt x="67074" y="40000"/>
-                </a:lnTo>
-                <a:lnTo>
-                  <a:pt x="67263" y="39717"/>
-                </a:lnTo>
-                <a:lnTo>
-                  <a:pt x="67357" y="39622"/>
-                </a:lnTo>
-                <a:lnTo>
-                  <a:pt x="67357" y="39717"/>
-                </a:lnTo>
-                <a:lnTo>
-                  <a:pt x="67263" y="40377"/>
-                </a:lnTo>
-                <a:lnTo>
-                  <a:pt x="66980" y="41226"/>
-                </a:lnTo>
-                <a:lnTo>
-                  <a:pt x="66791" y="41509"/>
-                </a:lnTo>
-                <a:lnTo>
-                  <a:pt x="66697" y="41603"/>
-                </a:lnTo>
-                <a:lnTo>
-                  <a:pt x="66414" y="42075"/>
-                </a:lnTo>
-                <a:lnTo>
-                  <a:pt x="65754" y="43962"/>
-                </a:lnTo>
-                <a:lnTo>
-                  <a:pt x="64905" y="46132"/>
-                </a:lnTo>
-                <a:lnTo>
-                  <a:pt x="64150" y="47547"/>
-                </a:lnTo>
-                <a:lnTo>
-                  <a:pt x="63395" y="48867"/>
-                </a:lnTo>
-                <a:lnTo>
-                  <a:pt x="62546" y="50094"/>
-                </a:lnTo>
-                <a:lnTo>
-                  <a:pt x="61697" y="51320"/>
-                </a:lnTo>
-                <a:lnTo>
-                  <a:pt x="60376" y="52452"/>
-                </a:lnTo>
-                <a:lnTo>
-                  <a:pt x="59810" y="53112"/>
-                </a:lnTo>
-                <a:lnTo>
-                  <a:pt x="59244" y="53773"/>
-                </a:lnTo>
-                <a:lnTo>
-                  <a:pt x="59999" y="53301"/>
-                </a:lnTo>
-                <a:lnTo>
-                  <a:pt x="59905" y="53490"/>
-                </a:lnTo>
-                <a:lnTo>
-                  <a:pt x="58018" y="54999"/>
-                </a:lnTo>
-                <a:lnTo>
-                  <a:pt x="57075" y="55660"/>
-                </a:lnTo>
-                <a:lnTo>
-                  <a:pt x="56037" y="56226"/>
-                </a:lnTo>
-                <a:lnTo>
-                  <a:pt x="57924" y="54716"/>
-                </a:lnTo>
-                <a:lnTo>
-                  <a:pt x="58867" y="53867"/>
-                </a:lnTo>
-                <a:lnTo>
-                  <a:pt x="59716" y="53018"/>
-                </a:lnTo>
-                <a:lnTo>
-                  <a:pt x="58961" y="53679"/>
-                </a:lnTo>
-                <a:lnTo>
-                  <a:pt x="58207" y="54245"/>
-                </a:lnTo>
-                <a:lnTo>
-                  <a:pt x="56603" y="55282"/>
-                </a:lnTo>
-                <a:lnTo>
-                  <a:pt x="54905" y="56226"/>
-                </a:lnTo>
-                <a:lnTo>
-                  <a:pt x="53301" y="57263"/>
-                </a:lnTo>
-                <a:lnTo>
-                  <a:pt x="52735" y="57452"/>
-                </a:lnTo>
-                <a:lnTo>
-                  <a:pt x="51509" y="57924"/>
-                </a:lnTo>
-                <a:lnTo>
-                  <a:pt x="47829" y="59527"/>
-                </a:lnTo>
-                <a:lnTo>
-                  <a:pt x="43962" y="61226"/>
-                </a:lnTo>
-                <a:lnTo>
-                  <a:pt x="42358" y="61886"/>
-                </a:lnTo>
-                <a:lnTo>
-                  <a:pt x="41414" y="62169"/>
-                </a:lnTo>
-                <a:lnTo>
-                  <a:pt x="39433" y="62452"/>
-                </a:lnTo>
-                <a:lnTo>
-                  <a:pt x="37169" y="62641"/>
-                </a:lnTo>
-                <a:lnTo>
-                  <a:pt x="33679" y="62829"/>
-                </a:lnTo>
-                <a:lnTo>
-                  <a:pt x="31226" y="62924"/>
-                </a:lnTo>
-                <a:lnTo>
-                  <a:pt x="29528" y="62924"/>
-                </a:lnTo>
-                <a:lnTo>
-                  <a:pt x="28301" y="62735"/>
-                </a:lnTo>
-                <a:lnTo>
-                  <a:pt x="27075" y="62546"/>
-                </a:lnTo>
-                <a:lnTo>
-                  <a:pt x="25754" y="62263"/>
-                </a:lnTo>
-                <a:lnTo>
-                  <a:pt x="24622" y="61886"/>
-                </a:lnTo>
-                <a:lnTo>
-                  <a:pt x="23396" y="61414"/>
-                </a:lnTo>
-                <a:lnTo>
-                  <a:pt x="21320" y="60565"/>
-                </a:lnTo>
-                <a:lnTo>
-                  <a:pt x="21509" y="60754"/>
-                </a:lnTo>
-                <a:lnTo>
-                  <a:pt x="21698" y="60848"/>
-                </a:lnTo>
-                <a:lnTo>
-                  <a:pt x="22169" y="61131"/>
-                </a:lnTo>
-                <a:lnTo>
-                  <a:pt x="21037" y="60659"/>
-                </a:lnTo>
-                <a:lnTo>
-                  <a:pt x="19434" y="59905"/>
-                </a:lnTo>
-                <a:lnTo>
-                  <a:pt x="15754" y="57924"/>
-                </a:lnTo>
-                <a:lnTo>
-                  <a:pt x="12453" y="56037"/>
-                </a:lnTo>
-                <a:lnTo>
-                  <a:pt x="11415" y="55377"/>
-                </a:lnTo>
-                <a:lnTo>
-                  <a:pt x="11226" y="55188"/>
-                </a:lnTo>
-                <a:lnTo>
-                  <a:pt x="11132" y="55094"/>
-                </a:lnTo>
-                <a:lnTo>
-                  <a:pt x="10377" y="54433"/>
-                </a:lnTo>
-                <a:lnTo>
-                  <a:pt x="9717" y="53679"/>
-                </a:lnTo>
-                <a:lnTo>
-                  <a:pt x="9717" y="53962"/>
-                </a:lnTo>
-                <a:lnTo>
-                  <a:pt x="9622" y="54150"/>
-                </a:lnTo>
-                <a:lnTo>
-                  <a:pt x="9528" y="54245"/>
-                </a:lnTo>
-                <a:lnTo>
-                  <a:pt x="9434" y="54245"/>
-                </a:lnTo>
-                <a:lnTo>
-                  <a:pt x="9151" y="54056"/>
-                </a:lnTo>
-                <a:lnTo>
-                  <a:pt x="8868" y="53679"/>
-                </a:lnTo>
-                <a:lnTo>
-                  <a:pt x="8585" y="53301"/>
-                </a:lnTo>
-                <a:lnTo>
-                  <a:pt x="8302" y="52829"/>
-                </a:lnTo>
-                <a:lnTo>
-                  <a:pt x="8302" y="52546"/>
-                </a:lnTo>
-                <a:lnTo>
-                  <a:pt x="8302" y="52452"/>
-                </a:lnTo>
-                <a:lnTo>
-                  <a:pt x="8396" y="52452"/>
-                </a:lnTo>
-                <a:lnTo>
-                  <a:pt x="7924" y="52263"/>
-                </a:lnTo>
-                <a:lnTo>
-                  <a:pt x="7358" y="51886"/>
-                </a:lnTo>
-                <a:lnTo>
-                  <a:pt x="6038" y="50660"/>
-                </a:lnTo>
-                <a:lnTo>
-                  <a:pt x="5849" y="50377"/>
-                </a:lnTo>
-                <a:lnTo>
-                  <a:pt x="5566" y="50094"/>
-                </a:lnTo>
-                <a:lnTo>
-                  <a:pt x="5566" y="50188"/>
-                </a:lnTo>
-                <a:lnTo>
-                  <a:pt x="4811" y="49339"/>
-                </a:lnTo>
-                <a:lnTo>
-                  <a:pt x="4717" y="49150"/>
-                </a:lnTo>
-                <a:lnTo>
-                  <a:pt x="5189" y="49433"/>
-                </a:lnTo>
-                <a:lnTo>
-                  <a:pt x="5377" y="49528"/>
-                </a:lnTo>
-                <a:lnTo>
-                  <a:pt x="5472" y="49716"/>
-                </a:lnTo>
-                <a:lnTo>
-                  <a:pt x="5660" y="50094"/>
-                </a:lnTo>
-                <a:lnTo>
-                  <a:pt x="5377" y="49056"/>
-                </a:lnTo>
-                <a:lnTo>
-                  <a:pt x="5000" y="48113"/>
-                </a:lnTo>
-                <a:lnTo>
-                  <a:pt x="4057" y="45660"/>
-                </a:lnTo>
-                <a:lnTo>
-                  <a:pt x="3585" y="44150"/>
-                </a:lnTo>
-                <a:lnTo>
-                  <a:pt x="3208" y="42358"/>
-                </a:lnTo>
-                <a:lnTo>
-                  <a:pt x="3396" y="42547"/>
-                </a:lnTo>
-                <a:lnTo>
-                  <a:pt x="3491" y="42452"/>
-                </a:lnTo>
-                <a:lnTo>
-                  <a:pt x="3585" y="42547"/>
-                </a:lnTo>
-                <a:lnTo>
-                  <a:pt x="3774" y="42641"/>
-                </a:lnTo>
-                <a:lnTo>
-                  <a:pt x="3679" y="40849"/>
-                </a:lnTo>
-                <a:lnTo>
-                  <a:pt x="3585" y="38962"/>
-                </a:lnTo>
-                <a:lnTo>
-                  <a:pt x="3679" y="37169"/>
-                </a:lnTo>
-                <a:lnTo>
-                  <a:pt x="3774" y="36320"/>
-                </a:lnTo>
-                <a:lnTo>
-                  <a:pt x="4057" y="35566"/>
-                </a:lnTo>
-                <a:lnTo>
-                  <a:pt x="4434" y="33585"/>
-                </a:lnTo>
-                <a:lnTo>
-                  <a:pt x="4434" y="33962"/>
-                </a:lnTo>
-                <a:lnTo>
-                  <a:pt x="4528" y="34245"/>
-                </a:lnTo>
-                <a:lnTo>
-                  <a:pt x="4717" y="32264"/>
-                </a:lnTo>
-                <a:lnTo>
-                  <a:pt x="5189" y="30283"/>
-                </a:lnTo>
-                <a:lnTo>
-                  <a:pt x="5755" y="28302"/>
-                </a:lnTo>
-                <a:lnTo>
-                  <a:pt x="6604" y="26321"/>
-                </a:lnTo>
-                <a:lnTo>
-                  <a:pt x="7453" y="24340"/>
-                </a:lnTo>
-                <a:lnTo>
-                  <a:pt x="8585" y="22547"/>
-                </a:lnTo>
-                <a:lnTo>
-                  <a:pt x="9717" y="20755"/>
-                </a:lnTo>
-                <a:lnTo>
-                  <a:pt x="10943" y="19245"/>
-                </a:lnTo>
-                <a:lnTo>
-                  <a:pt x="10849" y="19057"/>
-                </a:lnTo>
-                <a:lnTo>
-                  <a:pt x="10849" y="18868"/>
-                </a:lnTo>
-                <a:lnTo>
-                  <a:pt x="11132" y="18396"/>
-                </a:lnTo>
-                <a:lnTo>
-                  <a:pt x="11604" y="17830"/>
-                </a:lnTo>
-                <a:lnTo>
-                  <a:pt x="12264" y="17076"/>
-                </a:lnTo>
-                <a:lnTo>
-                  <a:pt x="14151" y="15472"/>
-                </a:lnTo>
-                <a:lnTo>
-                  <a:pt x="16415" y="13585"/>
-                </a:lnTo>
-                <a:lnTo>
-                  <a:pt x="18868" y="11793"/>
-                </a:lnTo>
-                <a:lnTo>
-                  <a:pt x="21226" y="10095"/>
-                </a:lnTo>
-                <a:lnTo>
-                  <a:pt x="23302" y="8868"/>
-                </a:lnTo>
-                <a:lnTo>
-                  <a:pt x="24717" y="8113"/>
-                </a:lnTo>
-                <a:lnTo>
-                  <a:pt x="24245" y="8491"/>
-                </a:lnTo>
-                <a:lnTo>
-                  <a:pt x="23773" y="8774"/>
-                </a:lnTo>
-                <a:lnTo>
-                  <a:pt x="24811" y="8208"/>
-                </a:lnTo>
-                <a:lnTo>
-                  <a:pt x="25566" y="7830"/>
-                </a:lnTo>
-                <a:lnTo>
-                  <a:pt x="27452" y="6981"/>
-                </a:lnTo>
-                <a:lnTo>
-                  <a:pt x="27264" y="6981"/>
-                </a:lnTo>
-                <a:lnTo>
-                  <a:pt x="26981" y="6887"/>
-                </a:lnTo>
-                <a:lnTo>
-                  <a:pt x="27830" y="6604"/>
-                </a:lnTo>
-                <a:lnTo>
-                  <a:pt x="29056" y="6132"/>
-                </a:lnTo>
-                <a:lnTo>
-                  <a:pt x="28679" y="6415"/>
-                </a:lnTo>
-                <a:lnTo>
-                  <a:pt x="29056" y="6510"/>
-                </a:lnTo>
-                <a:lnTo>
-                  <a:pt x="28962" y="6698"/>
-                </a:lnTo>
-                <a:lnTo>
-                  <a:pt x="30283" y="6227"/>
-                </a:lnTo>
-                <a:lnTo>
-                  <a:pt x="31698" y="5755"/>
-                </a:lnTo>
-                <a:lnTo>
-                  <a:pt x="33113" y="5378"/>
-                </a:lnTo>
-                <a:lnTo>
-                  <a:pt x="33867" y="5189"/>
-                </a:lnTo>
-                <a:lnTo>
-                  <a:pt x="34169" y="5151"/>
-                </a:lnTo>
-                <a:lnTo>
-                  <a:pt x="34169" y="5151"/>
-                </a:lnTo>
-                <a:lnTo>
-                  <a:pt x="34905" y="4906"/>
-                </a:lnTo>
-                <a:lnTo>
-                  <a:pt x="35754" y="4812"/>
-                </a:lnTo>
-                <a:lnTo>
-                  <a:pt x="36603" y="4812"/>
-                </a:lnTo>
-                <a:lnTo>
-                  <a:pt x="37547" y="4717"/>
-                </a:lnTo>
-                <a:lnTo>
-                  <a:pt x="37830" y="4717"/>
-                </a:lnTo>
-                <a:lnTo>
-                  <a:pt x="38396" y="4529"/>
-                </a:lnTo>
-                <a:lnTo>
-                  <a:pt x="38867" y="4340"/>
-                </a:lnTo>
-                <a:lnTo>
-                  <a:pt x="38867" y="4623"/>
-                </a:lnTo>
-                <a:lnTo>
-                  <a:pt x="42735" y="4340"/>
-                </a:lnTo>
-                <a:lnTo>
-                  <a:pt x="43207" y="4529"/>
-                </a:lnTo>
-                <a:lnTo>
-                  <a:pt x="43018" y="4529"/>
-                </a:lnTo>
-                <a:lnTo>
-                  <a:pt x="43867" y="4623"/>
-                </a:lnTo>
-                <a:lnTo>
-                  <a:pt x="44811" y="4434"/>
-                </a:lnTo>
-                <a:lnTo>
-                  <a:pt x="45094" y="4717"/>
-                </a:lnTo>
-                <a:lnTo>
-                  <a:pt x="45754" y="4906"/>
-                </a:lnTo>
-                <a:lnTo>
-                  <a:pt x="47546" y="5189"/>
-                </a:lnTo>
-                <a:lnTo>
-                  <a:pt x="49622" y="5566"/>
-                </a:lnTo>
-                <a:lnTo>
-                  <a:pt x="51131" y="5849"/>
-                </a:lnTo>
-                <a:lnTo>
-                  <a:pt x="51131" y="5849"/>
-                </a:lnTo>
-                <a:lnTo>
-                  <a:pt x="49244" y="5095"/>
-                </a:lnTo>
-                <a:lnTo>
-                  <a:pt x="46886" y="4529"/>
-                </a:lnTo>
-                <a:lnTo>
-                  <a:pt x="44433" y="3963"/>
-                </a:lnTo>
-                <a:lnTo>
-                  <a:pt x="41980" y="3491"/>
-                </a:lnTo>
-                <a:lnTo>
-                  <a:pt x="39528" y="3302"/>
-                </a:lnTo>
-                <a:lnTo>
-                  <a:pt x="37358" y="3208"/>
-                </a:lnTo>
-                <a:lnTo>
-                  <a:pt x="36415" y="3208"/>
-                </a:lnTo>
-                <a:lnTo>
-                  <a:pt x="35565" y="3302"/>
-                </a:lnTo>
-                <a:lnTo>
-                  <a:pt x="34811" y="3491"/>
-                </a:lnTo>
-                <a:lnTo>
-                  <a:pt x="34150" y="3680"/>
-                </a:lnTo>
-                <a:lnTo>
-                  <a:pt x="33490" y="3585"/>
-                </a:lnTo>
-                <a:lnTo>
-                  <a:pt x="32830" y="3491"/>
-                </a:lnTo>
-                <a:lnTo>
-                  <a:pt x="31509" y="3585"/>
-                </a:lnTo>
-                <a:lnTo>
-                  <a:pt x="30000" y="3868"/>
-                </a:lnTo>
-                <a:lnTo>
-                  <a:pt x="28490" y="4246"/>
-                </a:lnTo>
-                <a:lnTo>
-                  <a:pt x="26981" y="4812"/>
-                </a:lnTo>
-                <a:lnTo>
-                  <a:pt x="25471" y="5472"/>
-                </a:lnTo>
-                <a:lnTo>
-                  <a:pt x="23868" y="6321"/>
-                </a:lnTo>
-                <a:lnTo>
-                  <a:pt x="22358" y="7170"/>
-                </a:lnTo>
-                <a:lnTo>
-                  <a:pt x="20849" y="8113"/>
-                </a:lnTo>
-                <a:lnTo>
-                  <a:pt x="19339" y="9151"/>
-                </a:lnTo>
-                <a:lnTo>
-                  <a:pt x="17924" y="10283"/>
-                </a:lnTo>
-                <a:lnTo>
-                  <a:pt x="16604" y="11321"/>
-                </a:lnTo>
-                <a:lnTo>
-                  <a:pt x="14056" y="13491"/>
-                </a:lnTo>
-                <a:lnTo>
-                  <a:pt x="12075" y="15472"/>
-                </a:lnTo>
-                <a:lnTo>
-                  <a:pt x="9717" y="18491"/>
-                </a:lnTo>
-                <a:lnTo>
-                  <a:pt x="10000" y="17830"/>
-                </a:lnTo>
-                <a:lnTo>
-                  <a:pt x="10377" y="17264"/>
-                </a:lnTo>
-                <a:lnTo>
-                  <a:pt x="9717" y="18113"/>
-                </a:lnTo>
-                <a:lnTo>
-                  <a:pt x="9056" y="19057"/>
-                </a:lnTo>
-                <a:lnTo>
-                  <a:pt x="9151" y="19245"/>
-                </a:lnTo>
-                <a:lnTo>
-                  <a:pt x="8396" y="20189"/>
-                </a:lnTo>
-                <a:lnTo>
-                  <a:pt x="9151" y="18774"/>
-                </a:lnTo>
-                <a:lnTo>
-                  <a:pt x="8019" y="20377"/>
-                </a:lnTo>
-                <a:lnTo>
-                  <a:pt x="7075" y="22075"/>
-                </a:lnTo>
-                <a:lnTo>
-                  <a:pt x="6226" y="23868"/>
-                </a:lnTo>
-                <a:lnTo>
-                  <a:pt x="5472" y="25755"/>
-                </a:lnTo>
-                <a:lnTo>
-                  <a:pt x="4151" y="29434"/>
-                </a:lnTo>
-                <a:lnTo>
-                  <a:pt x="2924" y="32924"/>
-                </a:lnTo>
-                <a:lnTo>
-                  <a:pt x="3019" y="33113"/>
-                </a:lnTo>
-                <a:lnTo>
-                  <a:pt x="2924" y="33773"/>
-                </a:lnTo>
-                <a:lnTo>
-                  <a:pt x="2453" y="36509"/>
-                </a:lnTo>
-                <a:lnTo>
-                  <a:pt x="1981" y="39434"/>
-                </a:lnTo>
-                <a:lnTo>
-                  <a:pt x="1981" y="39528"/>
-                </a:lnTo>
-                <a:lnTo>
-                  <a:pt x="1981" y="39905"/>
-                </a:lnTo>
-                <a:lnTo>
-                  <a:pt x="1792" y="41415"/>
-                </a:lnTo>
-                <a:lnTo>
-                  <a:pt x="1698" y="42358"/>
-                </a:lnTo>
-                <a:lnTo>
-                  <a:pt x="1698" y="43301"/>
-                </a:lnTo>
-                <a:lnTo>
-                  <a:pt x="1792" y="44245"/>
-                </a:lnTo>
-                <a:lnTo>
-                  <a:pt x="1887" y="44999"/>
-                </a:lnTo>
-                <a:lnTo>
-                  <a:pt x="2170" y="46603"/>
-                </a:lnTo>
-                <a:lnTo>
-                  <a:pt x="2170" y="46603"/>
-                </a:lnTo>
-                <a:lnTo>
-                  <a:pt x="1887" y="46415"/>
-                </a:lnTo>
-                <a:lnTo>
-                  <a:pt x="1792" y="46320"/>
-                </a:lnTo>
-                <a:lnTo>
-                  <a:pt x="1792" y="46509"/>
-                </a:lnTo>
-                <a:lnTo>
-                  <a:pt x="1981" y="46981"/>
-                </a:lnTo>
-                <a:lnTo>
-                  <a:pt x="1415" y="46132"/>
-                </a:lnTo>
-                <a:lnTo>
-                  <a:pt x="1509" y="46509"/>
-                </a:lnTo>
-                <a:lnTo>
-                  <a:pt x="1321" y="46981"/>
-                </a:lnTo>
-                <a:lnTo>
-                  <a:pt x="472" y="45471"/>
-                </a:lnTo>
-                <a:lnTo>
-                  <a:pt x="377" y="45565"/>
-                </a:lnTo>
-                <a:lnTo>
-                  <a:pt x="283" y="45660"/>
-                </a:lnTo>
-                <a:lnTo>
-                  <a:pt x="189" y="45660"/>
-                </a:lnTo>
-                <a:lnTo>
-                  <a:pt x="0" y="45565"/>
-                </a:lnTo>
-                <a:lnTo>
-                  <a:pt x="0" y="45565"/>
-                </a:lnTo>
-                <a:lnTo>
-                  <a:pt x="1038" y="47924"/>
-                </a:lnTo>
-                <a:lnTo>
-                  <a:pt x="2264" y="50282"/>
-                </a:lnTo>
-                <a:lnTo>
-                  <a:pt x="2075" y="49905"/>
-                </a:lnTo>
-                <a:lnTo>
-                  <a:pt x="2170" y="49528"/>
-                </a:lnTo>
-                <a:lnTo>
-                  <a:pt x="2736" y="50188"/>
-                </a:lnTo>
-                <a:lnTo>
-                  <a:pt x="3208" y="50660"/>
-                </a:lnTo>
-                <a:lnTo>
-                  <a:pt x="3396" y="50943"/>
-                </a:lnTo>
-                <a:lnTo>
-                  <a:pt x="3396" y="51037"/>
-                </a:lnTo>
-                <a:lnTo>
-                  <a:pt x="3302" y="50943"/>
-                </a:lnTo>
-                <a:lnTo>
-                  <a:pt x="3302" y="50943"/>
-                </a:lnTo>
-                <a:lnTo>
-                  <a:pt x="3585" y="51320"/>
-                </a:lnTo>
-                <a:lnTo>
-                  <a:pt x="4623" y="53207"/>
-                </a:lnTo>
-                <a:lnTo>
-                  <a:pt x="5755" y="55094"/>
-                </a:lnTo>
-                <a:lnTo>
-                  <a:pt x="7075" y="56886"/>
-                </a:lnTo>
-                <a:lnTo>
-                  <a:pt x="8585" y="58490"/>
-                </a:lnTo>
-                <a:lnTo>
-                  <a:pt x="10189" y="59999"/>
-                </a:lnTo>
-                <a:lnTo>
-                  <a:pt x="11792" y="61414"/>
-                </a:lnTo>
-                <a:lnTo>
-                  <a:pt x="13585" y="62735"/>
-                </a:lnTo>
-                <a:lnTo>
-                  <a:pt x="15471" y="63867"/>
-                </a:lnTo>
-                <a:lnTo>
-                  <a:pt x="17641" y="64905"/>
-                </a:lnTo>
-                <a:lnTo>
-                  <a:pt x="20000" y="65942"/>
-                </a:lnTo>
-                <a:lnTo>
-                  <a:pt x="22358" y="66697"/>
-                </a:lnTo>
-                <a:lnTo>
-                  <a:pt x="24811" y="67263"/>
-                </a:lnTo>
-                <a:lnTo>
-                  <a:pt x="27264" y="67735"/>
-                </a:lnTo>
-                <a:lnTo>
-                  <a:pt x="29811" y="68018"/>
-                </a:lnTo>
-                <a:lnTo>
-                  <a:pt x="32264" y="68206"/>
-                </a:lnTo>
-                <a:lnTo>
-                  <a:pt x="34811" y="68112"/>
-                </a:lnTo>
-                <a:lnTo>
-                  <a:pt x="36981" y="67829"/>
-                </a:lnTo>
-                <a:lnTo>
-                  <a:pt x="40471" y="67263"/>
-                </a:lnTo>
-                <a:lnTo>
-                  <a:pt x="44056" y="66508"/>
-                </a:lnTo>
-                <a:lnTo>
-                  <a:pt x="45565" y="66131"/>
-                </a:lnTo>
-                <a:lnTo>
-                  <a:pt x="46509" y="65848"/>
-                </a:lnTo>
-                <a:lnTo>
-                  <a:pt x="46509" y="65942"/>
-                </a:lnTo>
-                <a:lnTo>
-                  <a:pt x="48018" y="65376"/>
-                </a:lnTo>
-                <a:lnTo>
-                  <a:pt x="49527" y="64622"/>
-                </a:lnTo>
-                <a:lnTo>
-                  <a:pt x="48867" y="64810"/>
-                </a:lnTo>
-                <a:lnTo>
-                  <a:pt x="50754" y="63773"/>
-                </a:lnTo>
-                <a:lnTo>
-                  <a:pt x="52546" y="62641"/>
-                </a:lnTo>
-                <a:lnTo>
-                  <a:pt x="54244" y="61320"/>
-                </a:lnTo>
-                <a:lnTo>
-                  <a:pt x="56037" y="59810"/>
-                </a:lnTo>
-                <a:lnTo>
-                  <a:pt x="55282" y="60659"/>
-                </a:lnTo>
-                <a:lnTo>
-                  <a:pt x="57263" y="59056"/>
-                </a:lnTo>
-                <a:lnTo>
-                  <a:pt x="58112" y="58395"/>
-                </a:lnTo>
-                <a:lnTo>
-                  <a:pt x="58207" y="58301"/>
-                </a:lnTo>
-                <a:lnTo>
-                  <a:pt x="58112" y="58301"/>
-                </a:lnTo>
-                <a:lnTo>
-                  <a:pt x="58584" y="57924"/>
-                </a:lnTo>
-                <a:lnTo>
-                  <a:pt x="59056" y="57546"/>
-                </a:lnTo>
-                <a:lnTo>
-                  <a:pt x="59999" y="56414"/>
-                </a:lnTo>
-                <a:lnTo>
-                  <a:pt x="61414" y="55188"/>
-                </a:lnTo>
-                <a:lnTo>
-                  <a:pt x="61414" y="55188"/>
-                </a:lnTo>
-                <a:lnTo>
-                  <a:pt x="61131" y="55282"/>
-                </a:lnTo>
-                <a:lnTo>
-                  <a:pt x="61508" y="54811"/>
-                </a:lnTo>
-                <a:lnTo>
-                  <a:pt x="62735" y="53867"/>
-                </a:lnTo>
-                <a:lnTo>
-                  <a:pt x="63867" y="52735"/>
-                </a:lnTo>
-                <a:lnTo>
-                  <a:pt x="66131" y="50471"/>
-                </a:lnTo>
-                <a:lnTo>
-                  <a:pt x="66131" y="50565"/>
-                </a:lnTo>
-                <a:lnTo>
-                  <a:pt x="66320" y="50660"/>
-                </a:lnTo>
-                <a:lnTo>
-                  <a:pt x="66414" y="50660"/>
-                </a:lnTo>
-                <a:lnTo>
-                  <a:pt x="66603" y="50565"/>
-                </a:lnTo>
-                <a:lnTo>
-                  <a:pt x="66603" y="50754"/>
-                </a:lnTo>
-                <a:lnTo>
-                  <a:pt x="66508" y="50943"/>
-                </a:lnTo>
-                <a:lnTo>
-                  <a:pt x="65848" y="51603"/>
-                </a:lnTo>
-                <a:lnTo>
-                  <a:pt x="64999" y="52546"/>
-                </a:lnTo>
-                <a:lnTo>
-                  <a:pt x="65376" y="52358"/>
-                </a:lnTo>
-                <a:lnTo>
-                  <a:pt x="65848" y="52075"/>
-                </a:lnTo>
-                <a:lnTo>
-                  <a:pt x="66697" y="51320"/>
-                </a:lnTo>
-                <a:lnTo>
-                  <a:pt x="67546" y="50282"/>
-                </a:lnTo>
-                <a:lnTo>
-                  <a:pt x="68301" y="49056"/>
-                </a:lnTo>
-                <a:lnTo>
-                  <a:pt x="69055" y="47830"/>
-                </a:lnTo>
-                <a:lnTo>
-                  <a:pt x="69716" y="46603"/>
-                </a:lnTo>
-                <a:lnTo>
-                  <a:pt x="70565" y="44811"/>
-                </a:lnTo>
-                <a:lnTo>
-                  <a:pt x="70282" y="45094"/>
-                </a:lnTo>
-                <a:lnTo>
-                  <a:pt x="70942" y="43490"/>
-                </a:lnTo>
-                <a:lnTo>
-                  <a:pt x="71037" y="43396"/>
-                </a:lnTo>
-                <a:lnTo>
-                  <a:pt x="71697" y="41320"/>
-                </a:lnTo>
-                <a:lnTo>
-                  <a:pt x="72263" y="39245"/>
-                </a:lnTo>
-                <a:lnTo>
-                  <a:pt x="72640" y="37358"/>
-                </a:lnTo>
-                <a:lnTo>
-                  <a:pt x="72923" y="35849"/>
-                </a:lnTo>
-                <a:lnTo>
-                  <a:pt x="72829" y="36226"/>
-                </a:lnTo>
-                <a:lnTo>
-                  <a:pt x="72735" y="36698"/>
-                </a:lnTo>
-                <a:lnTo>
-                  <a:pt x="72452" y="36981"/>
-                </a:lnTo>
-                <a:lnTo>
-                  <a:pt x="72169" y="37358"/>
-                </a:lnTo>
-                <a:lnTo>
-                  <a:pt x="72263" y="36981"/>
-                </a:lnTo>
-                <a:lnTo>
-                  <a:pt x="72452" y="36415"/>
-                </a:lnTo>
-                <a:lnTo>
-                  <a:pt x="72452" y="35849"/>
-                </a:lnTo>
-                <a:lnTo>
-                  <a:pt x="72357" y="35660"/>
-                </a:lnTo>
-                <a:lnTo>
-                  <a:pt x="72263" y="35471"/>
-                </a:lnTo>
-                <a:lnTo>
-                  <a:pt x="72640" y="33868"/>
-                </a:lnTo>
-                <a:lnTo>
-                  <a:pt x="72735" y="33113"/>
-                </a:lnTo>
-                <a:lnTo>
-                  <a:pt x="72735" y="32358"/>
-                </a:lnTo>
-                <a:lnTo>
-                  <a:pt x="72923" y="33207"/>
-                </a:lnTo>
-                <a:lnTo>
-                  <a:pt x="73018" y="34151"/>
-                </a:lnTo>
-                <a:lnTo>
-                  <a:pt x="72923" y="32358"/>
-                </a:lnTo>
-                <a:lnTo>
-                  <a:pt x="72923" y="31792"/>
-                </a:lnTo>
-                <a:lnTo>
-                  <a:pt x="73112" y="30754"/>
-                </a:lnTo>
-                <a:lnTo>
-                  <a:pt x="72829" y="31604"/>
-                </a:lnTo>
-                <a:lnTo>
-                  <a:pt x="72735" y="30283"/>
-                </a:lnTo>
-                <a:lnTo>
-                  <a:pt x="72546" y="28868"/>
-                </a:lnTo>
-                <a:lnTo>
-                  <a:pt x="72357" y="27641"/>
-                </a:lnTo>
-                <a:lnTo>
-                  <a:pt x="71980" y="26038"/>
-                </a:lnTo>
-                <a:lnTo>
-                  <a:pt x="71414" y="24151"/>
-                </a:lnTo>
-                <a:lnTo>
-                  <a:pt x="70754" y="22170"/>
-                </a:lnTo>
-                <a:lnTo>
-                  <a:pt x="69905" y="20000"/>
-                </a:lnTo>
-                <a:lnTo>
-                  <a:pt x="68867" y="18019"/>
-                </a:lnTo>
-                <a:lnTo>
-                  <a:pt x="68301" y="16981"/>
-                </a:lnTo>
-                <a:lnTo>
-                  <a:pt x="67735" y="16132"/>
-                </a:lnTo>
-                <a:lnTo>
-                  <a:pt x="67074" y="15283"/>
-                </a:lnTo>
-                <a:lnTo>
-                  <a:pt x="66414" y="14434"/>
-                </a:lnTo>
-                <a:lnTo>
-                  <a:pt x="66508" y="14623"/>
-                </a:lnTo>
-                <a:lnTo>
-                  <a:pt x="66414" y="14906"/>
-                </a:lnTo>
-                <a:lnTo>
-                  <a:pt x="65754" y="14057"/>
-                </a:lnTo>
-                <a:lnTo>
-                  <a:pt x="65093" y="13113"/>
-                </a:lnTo>
-                <a:lnTo>
-                  <a:pt x="64537" y="12278"/>
-                </a:lnTo>
-                <a:lnTo>
-                  <a:pt x="62924" y="10755"/>
-                </a:lnTo>
-                <a:lnTo>
-                  <a:pt x="63018" y="10755"/>
-                </a:lnTo>
-                <a:lnTo>
-                  <a:pt x="63018" y="10661"/>
-                </a:lnTo>
-                <a:lnTo>
-                  <a:pt x="62924" y="10472"/>
-                </a:lnTo>
-                <a:lnTo>
-                  <a:pt x="62263" y="9717"/>
-                </a:lnTo>
-                <a:lnTo>
-                  <a:pt x="60376" y="7830"/>
-                </a:lnTo>
-                <a:lnTo>
-                  <a:pt x="60754" y="8396"/>
-                </a:lnTo>
-                <a:lnTo>
-                  <a:pt x="61131" y="8774"/>
-                </a:lnTo>
-                <a:lnTo>
-                  <a:pt x="60376" y="8396"/>
-                </a:lnTo>
-                <a:lnTo>
-                  <a:pt x="59716" y="7925"/>
-                </a:lnTo>
-                <a:lnTo>
-                  <a:pt x="59087" y="7476"/>
-                </a:lnTo>
-                <a:lnTo>
-                  <a:pt x="59810" y="8302"/>
-                </a:lnTo>
-                <a:lnTo>
-                  <a:pt x="58678" y="7642"/>
-                </a:lnTo>
-                <a:lnTo>
-                  <a:pt x="57641" y="6981"/>
-                </a:lnTo>
-                <a:lnTo>
-                  <a:pt x="55471" y="5472"/>
-                </a:lnTo>
-                <a:lnTo>
-                  <a:pt x="53301" y="4057"/>
-                </a:lnTo>
-                <a:lnTo>
-                  <a:pt x="52169" y="3397"/>
-                </a:lnTo>
-                <a:lnTo>
-                  <a:pt x="51037" y="2831"/>
-                </a:lnTo>
-                <a:lnTo>
-                  <a:pt x="52075" y="2831"/>
-                </a:lnTo>
-                <a:lnTo>
-                  <a:pt x="50660" y="1982"/>
-                </a:lnTo>
-                <a:lnTo>
-                  <a:pt x="49811" y="1604"/>
-                </a:lnTo>
-                <a:lnTo>
-                  <a:pt x="48867" y="1227"/>
-                </a:lnTo>
-                <a:lnTo>
-                  <a:pt x="48018" y="849"/>
-                </a:lnTo>
-                <a:lnTo>
-                  <a:pt x="47075" y="661"/>
-                </a:lnTo>
-                <a:lnTo>
-                  <a:pt x="46226" y="566"/>
-                </a:lnTo>
-                <a:lnTo>
-                  <a:pt x="45471" y="661"/>
-                </a:lnTo>
-                <a:lnTo>
-                  <a:pt x="46226" y="849"/>
-                </a:lnTo>
-                <a:lnTo>
-                  <a:pt x="46866" y="1215"/>
-                </a:lnTo>
-                <a:lnTo>
-                  <a:pt x="46980" y="1227"/>
-                </a:lnTo>
-                <a:lnTo>
-                  <a:pt x="47452" y="1416"/>
-                </a:lnTo>
-                <a:lnTo>
-                  <a:pt x="47924" y="1510"/>
-                </a:lnTo>
-                <a:lnTo>
-                  <a:pt x="47358" y="1321"/>
-                </a:lnTo>
-                <a:lnTo>
-                  <a:pt x="46886" y="944"/>
-                </a:lnTo>
-                <a:lnTo>
-                  <a:pt x="47829" y="1227"/>
-                </a:lnTo>
-                <a:lnTo>
-                  <a:pt x="48773" y="1604"/>
-                </a:lnTo>
-                <a:lnTo>
-                  <a:pt x="49622" y="2076"/>
-                </a:lnTo>
-                <a:lnTo>
-                  <a:pt x="50377" y="2642"/>
-                </a:lnTo>
-                <a:lnTo>
-                  <a:pt x="50377" y="2642"/>
-                </a:lnTo>
-                <a:lnTo>
-                  <a:pt x="49622" y="2265"/>
-                </a:lnTo>
-                <a:lnTo>
-                  <a:pt x="48584" y="1887"/>
-                </a:lnTo>
-                <a:lnTo>
-                  <a:pt x="47358" y="1510"/>
-                </a:lnTo>
-                <a:lnTo>
-                  <a:pt x="46037" y="1132"/>
-                </a:lnTo>
-                <a:lnTo>
-                  <a:pt x="46809" y="1210"/>
-                </a:lnTo>
-                <a:lnTo>
-                  <a:pt x="44339" y="661"/>
-                </a:lnTo>
-                <a:lnTo>
-                  <a:pt x="44716" y="755"/>
-                </a:lnTo>
-                <a:lnTo>
-                  <a:pt x="43113" y="472"/>
-                </a:lnTo>
-                <a:lnTo>
-                  <a:pt x="41603" y="283"/>
-                </a:lnTo>
-                <a:lnTo>
-                  <a:pt x="40282" y="95"/>
-                </a:lnTo>
-                <a:lnTo>
-                  <a:pt x="39150" y="0"/>
-                </a:lnTo>
-                <a:close/>
-              </a:path>
-            </a:pathLst>
-          </a:custGeom>
-          <a:solidFill>
-            <a:srgbClr val="FFFFFF"/>
-          </a:solidFill>
-          <a:ln>
-            <a:noFill/>
-          </a:ln>
-        </p:spPr>
-        <p:txBody>
-          <a:bodyPr lIns="91425" tIns="91425" rIns="91425" bIns="91425" anchor="ctr" anchorCtr="0">
-            <a:noAutofit/>
-          </a:bodyPr>
-          <a:lstStyle/>
-          <a:p>
-            <a:pPr lvl="0">
-              <a:spcBef>
-                <a:spcPts val="0"/>
-              </a:spcBef>
-              <a:buNone/>
-            </a:pPr>
-            <a:endParaRPr/>
-          </a:p>
-        </p:txBody>
-      </p:sp>
-    </p:spTree>
-    <p:extLst>
-      <p:ext uri="{BB962C8B-B14F-4D97-AF65-F5344CB8AC3E}">
-        <p14:creationId xmlns:p14="http://schemas.microsoft.com/office/powerpoint/2010/main" val="1914183401"/>
-      </p:ext>
-    </p:extLst>
-  </p:cSld>
-  <p:clrMapOvr>
-    <a:masterClrMapping/>
-  </p:clrMapOvr>
-</p:sld>
-</file>
-
-<file path=ppt/slides/slide13.xml><?xml version="1.0" encoding="utf-8"?>
-<p:sld xmlns:a="http://schemas.openxmlformats.org/drawingml/2006/main" xmlns:r="http://schemas.openxmlformats.org/officeDocument/2006/relationships" xmlns:p="http://schemas.openxmlformats.org/presentationml/2006/main">
-  <p:cSld>
-    <p:spTree>
-      <p:nvGrpSpPr>
-        <p:cNvPr id="1" name="Shape 51"/>
-        <p:cNvGrpSpPr/>
-        <p:nvPr/>
-      </p:nvGrpSpPr>
-      <p:grpSpPr>
-        <a:xfrm>
-          <a:off x="0" y="0"/>
-          <a:ext cx="0" cy="0"/>
-          <a:chOff x="0" y="0"/>
-          <a:chExt cx="0" cy="0"/>
-        </a:xfrm>
-      </p:grpSpPr>
-      <p:sp>
-        <p:nvSpPr>
-          <p:cNvPr id="52" name="Shape 52"/>
-          <p:cNvSpPr txBox="1">
-            <a:spLocks noGrp="1"/>
-          </p:cNvSpPr>
-          <p:nvPr>
-            <p:ph type="title"/>
-          </p:nvPr>
-        </p:nvSpPr>
-        <p:spPr>
-          <a:xfrm>
-            <a:off x="0" y="422213"/>
-            <a:ext cx="9156000" cy="857400"/>
-          </a:xfrm>
-          <a:prstGeom prst="rect">
-            <a:avLst/>
-          </a:prstGeom>
-        </p:spPr>
-        <p:txBody>
-          <a:bodyPr lIns="91425" tIns="91425" rIns="91425" bIns="91425" anchor="t" anchorCtr="0">
-            <a:noAutofit/>
-          </a:bodyPr>
-          <a:lstStyle/>
-          <a:p>
-            <a:pPr lvl="0" rtl="0">
-              <a:spcBef>
-                <a:spcPts val="0"/>
-              </a:spcBef>
-              <a:buNone/>
-            </a:pPr>
-            <a:r>
-              <a:rPr lang="pt-BR" dirty="0"/>
-              <a:t>Próximos passos</a:t>
-            </a:r>
-            <a:endParaRPr lang="en" dirty="0"/>
-          </a:p>
-        </p:txBody>
-      </p:sp>
-      <p:sp>
-        <p:nvSpPr>
-          <p:cNvPr id="3" name="CaixaDeTexto 2">
-            <a:extLst>
-              <a:ext uri="{FF2B5EF4-FFF2-40B4-BE49-F238E27FC236}">
-                <a16:creationId xmlns:a16="http://schemas.microsoft.com/office/drawing/2014/main" id="{0C2DEAAA-983E-40A8-ABB7-ACC1A6BA213D}"/>
-              </a:ext>
-            </a:extLst>
-          </p:cNvPr>
-          <p:cNvSpPr txBox="1"/>
-          <p:nvPr/>
-        </p:nvSpPr>
-        <p:spPr>
-          <a:xfrm>
-            <a:off x="452567" y="1676724"/>
-            <a:ext cx="8250865" cy="2246769"/>
-          </a:xfrm>
-          <a:prstGeom prst="rect">
-            <a:avLst/>
-          </a:prstGeom>
-          <a:noFill/>
-        </p:spPr>
-        <p:txBody>
-          <a:bodyPr wrap="square" rtlCol="0">
-            <a:spAutoFit/>
-          </a:bodyPr>
-          <a:lstStyle/>
-          <a:p>
-            <a:pPr marL="342900" lvl="8" indent="-342900">
-              <a:buFont typeface="Arial" panose="020B0604020202020204" pitchFamily="34" charset="0"/>
-              <a:buChar char="•"/>
-            </a:pPr>
-            <a:r>
-              <a:rPr lang="pt-BR" sz="2000" dirty="0">
-                <a:solidFill>
-                  <a:schemeClr val="bg1"/>
-                </a:solidFill>
-                <a:latin typeface="Sniglet" panose="020B0604020202020204" charset="0"/>
-              </a:rPr>
-              <a:t>Concluir o gerenciamento de grupos</a:t>
-            </a:r>
-          </a:p>
-          <a:p>
-            <a:pPr marL="342900" lvl="8" indent="-342900">
-              <a:buFont typeface="Arial" panose="020B0604020202020204" pitchFamily="34" charset="0"/>
-              <a:buChar char="•"/>
-            </a:pPr>
-            <a:endParaRPr lang="pt-BR" sz="2000" dirty="0">
-              <a:solidFill>
-                <a:schemeClr val="bg1"/>
-              </a:solidFill>
-              <a:latin typeface="Sniglet" panose="020B0604020202020204" charset="0"/>
-            </a:endParaRPr>
-          </a:p>
-          <a:p>
-            <a:pPr marL="342900" lvl="8" indent="-342900">
-              <a:buFont typeface="Arial" panose="020B0604020202020204" pitchFamily="34" charset="0"/>
-              <a:buChar char="•"/>
-            </a:pPr>
-            <a:r>
-              <a:rPr lang="pt-BR" sz="2000" dirty="0">
-                <a:solidFill>
-                  <a:schemeClr val="bg1"/>
-                </a:solidFill>
-                <a:latin typeface="Sniglet" panose="020B0604020202020204" charset="0"/>
-              </a:rPr>
-              <a:t>Gerenciar projetos em grupo</a:t>
-            </a:r>
-          </a:p>
-          <a:p>
-            <a:pPr marL="342900" lvl="8" indent="-342900">
-              <a:buFont typeface="Arial" panose="020B0604020202020204" pitchFamily="34" charset="0"/>
-              <a:buChar char="•"/>
-            </a:pPr>
-            <a:endParaRPr lang="pt-BR" sz="2000" dirty="0">
-              <a:solidFill>
-                <a:schemeClr val="bg1"/>
-              </a:solidFill>
-              <a:latin typeface="Sniglet" panose="020B0604020202020204" charset="0"/>
-            </a:endParaRPr>
-          </a:p>
-          <a:p>
-            <a:pPr marL="342900" lvl="8" indent="-342900">
-              <a:buFont typeface="Arial" panose="020B0604020202020204" pitchFamily="34" charset="0"/>
-              <a:buChar char="•"/>
-            </a:pPr>
-            <a:r>
-              <a:rPr lang="pt-BR" sz="2000" dirty="0">
-                <a:solidFill>
-                  <a:schemeClr val="bg1"/>
-                </a:solidFill>
-                <a:latin typeface="Sniglet" panose="020B0604020202020204" charset="0"/>
-              </a:rPr>
-              <a:t>Perfis</a:t>
-            </a:r>
-          </a:p>
-          <a:p>
-            <a:pPr marL="342900" lvl="8" indent="-342900">
-              <a:buFont typeface="Arial" panose="020B0604020202020204" pitchFamily="34" charset="0"/>
-              <a:buChar char="•"/>
-            </a:pPr>
-            <a:endParaRPr lang="pt-BR" sz="2000" dirty="0">
-              <a:solidFill>
-                <a:schemeClr val="bg1"/>
-              </a:solidFill>
-              <a:latin typeface="Sniglet" panose="020B0604020202020204" charset="0"/>
-            </a:endParaRPr>
-          </a:p>
-          <a:p>
-            <a:pPr marL="342900" lvl="8" indent="-342900">
-              <a:buFont typeface="Arial" panose="020B0604020202020204" pitchFamily="34" charset="0"/>
-              <a:buChar char="•"/>
-            </a:pPr>
-            <a:r>
-              <a:rPr lang="pt-BR" sz="2000" dirty="0">
-                <a:solidFill>
-                  <a:schemeClr val="bg1"/>
-                </a:solidFill>
-                <a:latin typeface="Sniglet" panose="020B0604020202020204" charset="0"/>
-              </a:rPr>
-              <a:t>Tabelas de planejamento</a:t>
-            </a:r>
-          </a:p>
-        </p:txBody>
-      </p:sp>
-    </p:spTree>
-    <p:extLst>
-      <p:ext uri="{BB962C8B-B14F-4D97-AF65-F5344CB8AC3E}">
-        <p14:creationId xmlns:p14="http://schemas.microsoft.com/office/powerpoint/2010/main" val="2121823252"/>
-      </p:ext>
-    </p:extLst>
-  </p:cSld>
-  <p:clrMapOvr>
-    <a:masterClrMapping/>
-  </p:clrMapOvr>
-</p:sld>
-</file>
-
-<file path=ppt/slides/slide14.xml><?xml version="1.0" encoding="utf-8"?>
-<p:sld xmlns:a="http://schemas.openxmlformats.org/drawingml/2006/main" xmlns:r="http://schemas.openxmlformats.org/officeDocument/2006/relationships" xmlns:p="http://schemas.openxmlformats.org/presentationml/2006/main">
-  <p:cSld>
-    <p:spTree>
-      <p:nvGrpSpPr>
         <p:cNvPr id="1" name="Shape 37"/>
         <p:cNvGrpSpPr/>
         <p:nvPr/>
@@ -13319,7 +10034,7 @@
         <p:spPr>
           <a:xfrm>
             <a:off x="452567" y="1676724"/>
-            <a:ext cx="8250865" cy="1323439"/>
+            <a:ext cx="8250865" cy="400110"/>
           </a:xfrm>
           <a:prstGeom prst="rect">
             <a:avLst/>
@@ -13343,49 +10058,7 @@
                 </a:solidFill>
                 <a:latin typeface="Sniglet" panose="020B0604020202020204" charset="0"/>
               </a:rPr>
-              <a:t>Acompanhamento dos projetos de pesquisa</a:t>
-            </a:r>
-          </a:p>
-          <a:p>
-            <a:pPr marL="342900" lvl="8" indent="-342900">
-              <a:buFont typeface="Arial" panose="020B0604020202020204" pitchFamily="34" charset="0"/>
-              <a:buChar char="•"/>
-            </a:pPr>
-            <a:endParaRPr lang="pt-BR" sz="2000" dirty="0">
-              <a:solidFill>
-                <a:schemeClr val="bg1"/>
-              </a:solidFill>
-              <a:latin typeface="Sniglet" panose="020B0604020202020204" charset="0"/>
-            </a:endParaRPr>
-          </a:p>
-          <a:p>
-            <a:pPr marL="342900" lvl="8" indent="-342900">
-              <a:buFont typeface="Arial" panose="020B0604020202020204" pitchFamily="34" charset="0"/>
-              <a:buChar char="•"/>
-            </a:pPr>
-            <a:r>
-              <a:rPr lang="pt-BR" sz="2000" dirty="0">
-                <a:solidFill>
-                  <a:schemeClr val="bg1"/>
-                </a:solidFill>
-                <a:latin typeface="Sniglet" panose="020B0604020202020204" charset="0"/>
-              </a:rPr>
-              <a:t>Organização da documentação de testes</a:t>
-            </a:r>
-          </a:p>
-          <a:p>
-            <a:pPr marL="342900" lvl="8" indent="-342900">
-              <a:buFont typeface="Arial" panose="020B0604020202020204" pitchFamily="34" charset="0"/>
-              <a:buChar char="•"/>
-            </a:pPr>
-            <a:r>
-              <a:rPr lang="pt-BR" sz="2000" dirty="0">
-                <a:solidFill>
-                  <a:schemeClr val="bg1"/>
-                </a:solidFill>
-                <a:latin typeface="Sniglet" panose="020B0604020202020204" charset="0"/>
-              </a:rPr>
-              <a:t>Definição de atividades a serem desenvolvidas</a:t>
+              <a:t>Dificuldade do acompanhamento dos projetos de pesquisa</a:t>
             </a:r>
           </a:p>
         </p:txBody>
@@ -13721,7 +10394,7 @@
         </p:blipFill>
         <p:spPr bwMode="auto">
           <a:xfrm>
-            <a:off x="2118565" y="1133798"/>
+            <a:off x="4225132" y="1081044"/>
             <a:ext cx="4918868" cy="3661824"/>
           </a:xfrm>
           <a:prstGeom prst="rect">
@@ -13945,7 +10618,7 @@
             </a:pPr>
             <a:r>
               <a:rPr lang="pt-BR" dirty="0"/>
-              <a:t>Qual o diferencial das que já foram desenvolvidas</a:t>
+              <a:t>Sistemas semelhantes já desenvolvidos</a:t>
             </a:r>
             <a:endParaRPr lang="en" dirty="0"/>
           </a:p>

</xml_diff>